<commit_message>
more workshop page images
</commit_message>
<xml_diff>
--- a/images/workshop page/workshop page TLOU Infected.pptx
+++ b/images/workshop page/workshop page TLOU Infected.pptx
@@ -6,9 +6,11 @@
   </p:sldMasterIdLst>
   <p:sldIdLst>
     <p:sldId id="256" r:id="rId2"/>
-    <p:sldId id="257" r:id="rId3"/>
-    <p:sldId id="258" r:id="rId4"/>
-    <p:sldId id="259" r:id="rId5"/>
+    <p:sldId id="261" r:id="rId3"/>
+    <p:sldId id="260" r:id="rId4"/>
+    <p:sldId id="257" r:id="rId5"/>
+    <p:sldId id="258" r:id="rId6"/>
+    <p:sldId id="259" r:id="rId7"/>
   </p:sldIdLst>
   <p:sldSz cx="12192000" cy="6858000"/>
   <p:notesSz cx="6858000" cy="9144000"/>
@@ -107,6 +109,11 @@
       </a:defRPr>
     </a:lvl9pPr>
   </p:defaultTextStyle>
+  <p:extLst>
+    <p:ext uri="{EFAFB233-063F-42B5-8137-9DF3F51BA10A}">
+      <p15:sldGuideLst xmlns:p15="http://schemas.microsoft.com/office/powerpoint/2012/main"/>
+    </p:ext>
+  </p:extLst>
 </p:presentation>
 </file>
 
@@ -3324,6 +3331,144 @@
           <a:chExt cx="0" cy="0"/>
         </a:xfrm>
       </p:grpSpPr>
+      <p:pic>
+        <p:nvPicPr>
+          <p:cNvPr id="3" name="Image 2">
+            <a:extLst>
+              <a:ext uri="{FF2B5EF4-FFF2-40B4-BE49-F238E27FC236}">
+                <a16:creationId xmlns:a16="http://schemas.microsoft.com/office/drawing/2014/main" id="{52E7C420-58C6-1AAE-785A-D2D9DF8C0E83}"/>
+              </a:ext>
+            </a:extLst>
+          </p:cNvPr>
+          <p:cNvPicPr>
+            <a:picLocks noChangeAspect="1"/>
+          </p:cNvPicPr>
+          <p:nvPr/>
+        </p:nvPicPr>
+        <p:blipFill>
+          <a:blip r:embed="rId2"/>
+          <a:stretch>
+            <a:fillRect/>
+          </a:stretch>
+        </p:blipFill>
+        <p:spPr>
+          <a:xfrm>
+            <a:off x="2825750" y="1497106"/>
+            <a:ext cx="6868954" cy="3863787"/>
+          </a:xfrm>
+          <a:prstGeom prst="rect">
+            <a:avLst/>
+          </a:prstGeom>
+        </p:spPr>
+      </p:pic>
+      <p:sp>
+        <p:nvSpPr>
+          <p:cNvPr id="5" name="ZoneTexte 4">
+            <a:extLst>
+              <a:ext uri="{FF2B5EF4-FFF2-40B4-BE49-F238E27FC236}">
+                <a16:creationId xmlns:a16="http://schemas.microsoft.com/office/drawing/2014/main" id="{578D9BE6-39AC-1F3D-6451-6F5869E6F244}"/>
+              </a:ext>
+            </a:extLst>
+          </p:cNvPr>
+          <p:cNvSpPr txBox="1"/>
+          <p:nvPr/>
+        </p:nvSpPr>
+        <p:spPr>
+          <a:xfrm>
+            <a:off x="3159124" y="2351781"/>
+            <a:ext cx="6191251" cy="1077218"/>
+          </a:xfrm>
+          <a:prstGeom prst="rect">
+            <a:avLst/>
+          </a:prstGeom>
+          <a:solidFill>
+            <a:srgbClr val="1B2838">
+              <a:alpha val="60000"/>
+            </a:srgbClr>
+          </a:solidFill>
+        </p:spPr>
+        <p:txBody>
+          <a:bodyPr wrap="square" rtlCol="0">
+            <a:spAutoFit/>
+          </a:bodyPr>
+          <a:lstStyle/>
+          <a:p>
+            <a:pPr algn="just"/>
+            <a:r>
+              <a:rPr lang="en-US" sz="1600" dirty="0">
+                <a:solidFill>
+                  <a:schemeClr val="bg1"/>
+                </a:solidFill>
+                <a:effectLst>
+                  <a:outerShdw blurRad="76200" dist="38100" dir="12480000" algn="l" rotWithShape="0">
+                    <a:prstClr val="black"/>
+                  </a:outerShdw>
+                </a:effectLst>
+                <a:latin typeface="Lora" panose="02000503000000020004" pitchFamily="2" charset="0"/>
+              </a:rPr>
+              <a:t>Fight the infected of The Last of Us thanks to this mod. The goal is to make zombies of Project </a:t>
+            </a:r>
+            <a:r>
+              <a:rPr lang="en-US" sz="1600" dirty="0" err="1">
+                <a:solidFill>
+                  <a:schemeClr val="bg1"/>
+                </a:solidFill>
+                <a:effectLst>
+                  <a:outerShdw blurRad="76200" dist="38100" dir="12480000" algn="l" rotWithShape="0">
+                    <a:prstClr val="black"/>
+                  </a:outerShdw>
+                </a:effectLst>
+                <a:latin typeface="Lora" panose="02000503000000020004" pitchFamily="2" charset="0"/>
+              </a:rPr>
+              <a:t>Zomboid</a:t>
+            </a:r>
+            <a:r>
+              <a:rPr lang="en-US" sz="1600" dirty="0">
+                <a:solidFill>
+                  <a:schemeClr val="bg1"/>
+                </a:solidFill>
+                <a:effectLst>
+                  <a:outerShdw blurRad="76200" dist="38100" dir="12480000" algn="l" rotWithShape="0">
+                    <a:prstClr val="black"/>
+                  </a:outerShdw>
+                </a:effectLst>
+                <a:latin typeface="Lora" panose="02000503000000020004" pitchFamily="2" charset="0"/>
+              </a:rPr>
+              <a:t> harder with new mechanics to not have the need for massive population amounts just to have some difficulty in the game.</a:t>
+            </a:r>
+          </a:p>
+        </p:txBody>
+      </p:sp>
+    </p:spTree>
+    <p:extLst>
+      <p:ext uri="{BB962C8B-B14F-4D97-AF65-F5344CB8AC3E}">
+        <p14:creationId xmlns:p14="http://schemas.microsoft.com/office/powerpoint/2010/main" val="891567605"/>
+      </p:ext>
+    </p:extLst>
+  </p:cSld>
+  <p:clrMapOvr>
+    <a:masterClrMapping/>
+  </p:clrMapOvr>
+</p:sld>
+</file>
+
+<file path=ppt/slides/slide2.xml><?xml version="1.0" encoding="utf-8"?>
+<p:sld xmlns:a="http://schemas.openxmlformats.org/drawingml/2006/main" xmlns:r="http://schemas.openxmlformats.org/officeDocument/2006/relationships" xmlns:p="http://schemas.openxmlformats.org/presentationml/2006/main">
+  <p:cSld>
+    <p:spTree>
+      <p:nvGrpSpPr>
+        <p:cNvPr id="1" name=""/>
+        <p:cNvGrpSpPr/>
+        <p:nvPr/>
+      </p:nvGrpSpPr>
+      <p:grpSpPr>
+        <a:xfrm>
+          <a:off x="0" y="0"/>
+          <a:ext cx="0" cy="0"/>
+          <a:chOff x="0" y="0"/>
+          <a:chExt cx="0" cy="0"/>
+        </a:xfrm>
+      </p:grpSpPr>
       <p:sp>
         <p:nvSpPr>
           <p:cNvPr id="10" name="Rectangle 9">
@@ -3393,7 +3538,7 @@
         <p:spPr>
           <a:xfrm>
             <a:off x="2770094" y="71717"/>
-            <a:ext cx="6651812" cy="3508653"/>
+            <a:ext cx="6651812" cy="3293209"/>
           </a:xfrm>
           <a:prstGeom prst="rect">
             <a:avLst/>
@@ -3408,14 +3553,31 @@
           <a:p>
             <a:pPr algn="just"/>
             <a:r>
-              <a:rPr lang="en-US" sz="1200" dirty="0">
-                <a:solidFill>
-                  <a:schemeClr val="bg1"/>
-                </a:solidFill>
-                <a:latin typeface="Lora" panose="02000503000000020004" pitchFamily="2" charset="0"/>
-              </a:rPr>
-              <a:t>Runners are humans recently infected by the Cordyceps fungus. They can quickly overwhelm you with their sheer speed and numbers but are exposed to attacks from weapons. You may hear them talking and struggling from within, with the soul of the host likely still present but unable to control their body.</a:t>
-            </a:r>
+              <a:rPr lang="fr-FR" sz="2000" b="0" i="0" dirty="0" err="1">
+                <a:solidFill>
+                  <a:schemeClr val="accent4"/>
+                </a:solidFill>
+                <a:effectLst/>
+                <a:latin typeface="Algerian" panose="04020705040A02060702" pitchFamily="82" charset="0"/>
+              </a:rPr>
+              <a:t>Suggested</a:t>
+            </a:r>
+            <a:r>
+              <a:rPr lang="fr-FR" sz="2000" b="0" i="0" dirty="0">
+                <a:solidFill>
+                  <a:schemeClr val="accent4"/>
+                </a:solidFill>
+                <a:effectLst/>
+                <a:latin typeface="Algerian" panose="04020705040A02060702" pitchFamily="82" charset="0"/>
+              </a:rPr>
+              <a:t> settings</a:t>
+            </a:r>
+            <a:endParaRPr lang="fr-FR" sz="1200" dirty="0">
+              <a:solidFill>
+                <a:schemeClr val="bg1"/>
+              </a:solidFill>
+              <a:latin typeface="Lora" panose="02000503000000020004" pitchFamily="2" charset="0"/>
+            </a:endParaRPr>
           </a:p>
           <a:p>
             <a:pPr algn="just"/>
@@ -3427,6 +3589,36 @@
             </a:endParaRPr>
           </a:p>
           <a:p>
+            <a:pPr marL="171450" indent="-171450" algn="just">
+              <a:buFont typeface="Wingdings" panose="05000000000000000000" pitchFamily="2" charset="2"/>
+              <a:buChar char="v"/>
+            </a:pPr>
+            <a:r>
+              <a:rPr lang="en-US" sz="1200" dirty="0">
+                <a:solidFill>
+                  <a:schemeClr val="bg1"/>
+                </a:solidFill>
+                <a:latin typeface="Lora" panose="02000503000000020004" pitchFamily="2" charset="0"/>
+              </a:rPr>
+              <a:t>Set your population to a low number ! Test your population settings, don't hesitate to lower them down, I myself set it to an even lower value !</a:t>
+            </a:r>
+          </a:p>
+          <a:p>
+            <a:pPr marL="171450" indent="-171450" algn="just">
+              <a:buFont typeface="Wingdings" panose="05000000000000000000" pitchFamily="2" charset="2"/>
+              <a:buChar char="v"/>
+            </a:pPr>
+            <a:r>
+              <a:rPr lang="en-US" sz="1200" dirty="0">
+                <a:solidFill>
+                  <a:schemeClr val="bg1"/>
+                </a:solidFill>
+                <a:latin typeface="Lora" panose="02000503000000020004" pitchFamily="2" charset="0"/>
+              </a:rPr>
+              <a:t>Green apocalypse settings (10 Years Later, no electricity, no water, Barricaded World, rare loot...).</a:t>
+            </a:r>
+          </a:p>
+          <a:p>
             <a:pPr algn="just"/>
             <a:endParaRPr lang="en-US" sz="1200" dirty="0">
               <a:solidFill>
@@ -3437,19 +3629,38 @@
           </a:p>
           <a:p>
             <a:pPr algn="just"/>
+            <a:endParaRPr lang="en-US" sz="1200" dirty="0">
+              <a:solidFill>
+                <a:schemeClr val="bg1"/>
+              </a:solidFill>
+              <a:latin typeface="Lora" panose="02000503000000020004" pitchFamily="2" charset="0"/>
+            </a:endParaRPr>
+          </a:p>
+          <a:p>
+            <a:pPr algn="just"/>
             <a:r>
               <a:rPr lang="fr-FR" sz="2000" b="0" i="0" dirty="0">
                 <a:solidFill>
-                  <a:srgbClr val="7AF300"/>
+                  <a:schemeClr val="accent4"/>
                 </a:solidFill>
                 <a:effectLst/>
                 <a:latin typeface="Algerian" panose="04020705040A02060702" pitchFamily="82" charset="0"/>
               </a:rPr>
-              <a:t>Runners behavior</a:t>
+              <a:t>Small </a:t>
+            </a:r>
+            <a:r>
+              <a:rPr lang="fr-FR" sz="2000" b="0" i="0" dirty="0" err="1">
+                <a:solidFill>
+                  <a:schemeClr val="accent4"/>
+                </a:solidFill>
+                <a:effectLst/>
+                <a:latin typeface="Algerian" panose="04020705040A02060702" pitchFamily="82" charset="0"/>
+              </a:rPr>
+              <a:t>tips</a:t>
             </a:r>
             <a:endParaRPr lang="fr-FR" sz="2000" dirty="0">
               <a:solidFill>
-                <a:srgbClr val="7AF300"/>
+                <a:schemeClr val="accent4"/>
               </a:solidFill>
               <a:latin typeface="Algerian" panose="04020705040A02060702" pitchFamily="82" charset="0"/>
             </a:endParaRPr>
@@ -3475,7 +3686,7 @@
                 </a:solidFill>
                 <a:latin typeface="Lora" panose="02000503000000020004" pitchFamily="2" charset="0"/>
               </a:rPr>
-              <a:t>Tend to be in groups in the street, compared to other infected type that will hide inside buildings</a:t>
+              <a:t>Sprinters but can be slowed down by using mods that slow down sprinters</a:t>
             </a:r>
           </a:p>
           <a:p>
@@ -3490,7 +3701,7 @@
                 </a:solidFill>
                 <a:latin typeface="Lora" panose="02000503000000020004" pitchFamily="2" charset="0"/>
               </a:rPr>
-              <a:t>Sprinters*</a:t>
+              <a:t>You can tweak the infected types weights in real time to make the infected population increase across time.</a:t>
             </a:r>
           </a:p>
           <a:p>
@@ -3505,99 +3716,15 @@
                 </a:solidFill>
                 <a:latin typeface="Lora" panose="02000503000000020004" pitchFamily="2" charset="0"/>
               </a:rPr>
-              <a:t>Can climb small fences*</a:t>
-            </a:r>
-          </a:p>
-          <a:p>
-            <a:pPr marL="171450" indent="-171450" algn="just">
-              <a:buFont typeface="Wingdings" panose="05000000000000000000" pitchFamily="2" charset="2"/>
-              <a:buChar char="v"/>
-            </a:pPr>
-            <a:r>
-              <a:rPr lang="en-US" sz="1200" dirty="0">
-                <a:solidFill>
-                  <a:schemeClr val="bg1"/>
-                </a:solidFill>
-                <a:latin typeface="Lora" panose="02000503000000020004" pitchFamily="2" charset="0"/>
-              </a:rPr>
-              <a:t>Have normal human strength* and toughness* meaning they are fragile against attacks</a:t>
-            </a:r>
-          </a:p>
-          <a:p>
-            <a:pPr marL="171450" indent="-171450" algn="just">
-              <a:buFont typeface="Wingdings" panose="05000000000000000000" pitchFamily="2" charset="2"/>
-              <a:buChar char="v"/>
-            </a:pPr>
-            <a:r>
-              <a:rPr lang="en-US" sz="1200" dirty="0">
-                <a:solidFill>
-                  <a:schemeClr val="bg1"/>
-                </a:solidFill>
-                <a:latin typeface="Lora" panose="02000503000000020004" pitchFamily="2" charset="0"/>
-              </a:rPr>
-              <a:t>The number is their strength, do not take them too lightly</a:t>
-            </a:r>
-          </a:p>
-          <a:p>
-            <a:pPr marL="171450" indent="-171450" algn="just">
-              <a:buFont typeface="Wingdings" panose="05000000000000000000" pitchFamily="2" charset="2"/>
-              <a:buChar char="v"/>
-            </a:pPr>
-            <a:r>
-              <a:rPr lang="en-US" sz="1200" dirty="0">
-                <a:solidFill>
-                  <a:schemeClr val="bg1"/>
-                </a:solidFill>
-                <a:latin typeface="Lora" panose="02000503000000020004" pitchFamily="2" charset="0"/>
-              </a:rPr>
-              <a:t>Have medium sensibility to fire*</a:t>
-            </a:r>
-          </a:p>
-          <a:p>
-            <a:pPr marL="171450" indent="-171450" algn="just">
-              <a:buFont typeface="Wingdings" panose="05000000000000000000" pitchFamily="2" charset="2"/>
-              <a:buChar char="v"/>
-            </a:pPr>
-            <a:endParaRPr lang="en-US" sz="1200" dirty="0">
-              <a:solidFill>
-                <a:schemeClr val="bg1"/>
-              </a:solidFill>
-              <a:latin typeface="Lora" panose="02000503000000020004" pitchFamily="2" charset="0"/>
-            </a:endParaRPr>
-          </a:p>
-          <a:p>
-            <a:pPr algn="just"/>
-            <a:r>
-              <a:rPr lang="en-US" sz="1000" i="1" dirty="0">
-                <a:solidFill>
-                  <a:schemeClr val="bg1"/>
-                </a:solidFill>
-                <a:latin typeface="Lora" panose="02000503000000020004" pitchFamily="2" charset="0"/>
-              </a:rPr>
-              <a:t>* can be modified in the sandbox options</a:t>
-            </a:r>
-            <a:endParaRPr lang="fr-FR" sz="1000" i="1" dirty="0">
-              <a:solidFill>
-                <a:schemeClr val="bg1"/>
-              </a:solidFill>
-              <a:latin typeface="Lora" panose="02000503000000020004" pitchFamily="2" charset="0"/>
-            </a:endParaRPr>
-          </a:p>
-          <a:p>
-            <a:pPr algn="just"/>
-            <a:endParaRPr lang="fr-FR" sz="1200" dirty="0">
-              <a:solidFill>
-                <a:schemeClr val="bg1"/>
-              </a:solidFill>
-              <a:latin typeface="Lora" panose="02000503000000020004" pitchFamily="2" charset="0"/>
-            </a:endParaRPr>
+              <a:t>Fire is much more powerful against the infected than normal zombies or fresh infected (runners). It is more than a horde clearing tool but an actual weapon that can make Clickers and Bloaters a walk in the park (sort of).</a:t>
+            </a:r>
           </a:p>
         </p:txBody>
       </p:sp>
     </p:spTree>
     <p:extLst>
       <p:ext uri="{BB962C8B-B14F-4D97-AF65-F5344CB8AC3E}">
-        <p14:creationId xmlns:p14="http://schemas.microsoft.com/office/powerpoint/2010/main" val="891567605"/>
+        <p14:creationId xmlns:p14="http://schemas.microsoft.com/office/powerpoint/2010/main" val="2108096204"/>
       </p:ext>
     </p:extLst>
   </p:cSld>
@@ -3607,7 +3734,7 @@
 </p:sld>
 </file>
 
-<file path=ppt/slides/slide2.xml><?xml version="1.0" encoding="utf-8"?>
+<file path=ppt/slides/slide3.xml><?xml version="1.0" encoding="utf-8"?>
 <p:sld xmlns:a="http://schemas.openxmlformats.org/drawingml/2006/main" xmlns:r="http://schemas.openxmlformats.org/officeDocument/2006/relationships" xmlns:p="http://schemas.openxmlformats.org/presentationml/2006/main">
   <p:cSld>
     <p:spTree>
@@ -3693,7 +3820,7 @@
         <p:spPr>
           <a:xfrm>
             <a:off x="2770094" y="71717"/>
-            <a:ext cx="6651812" cy="4001095"/>
+            <a:ext cx="6651812" cy="3508653"/>
           </a:xfrm>
           <a:prstGeom prst="rect">
             <a:avLst/>
@@ -3714,25 +3841,7 @@
                 </a:solidFill>
                 <a:latin typeface="Lora" panose="02000503000000020004" pitchFamily="2" charset="0"/>
               </a:rPr>
-              <a:t>Stalkers evolve from Runners with the </a:t>
-            </a:r>
-            <a:r>
-              <a:rPr lang="en-US" sz="1200" dirty="0" err="1">
-                <a:solidFill>
-                  <a:schemeClr val="bg1"/>
-                </a:solidFill>
-                <a:latin typeface="Lora" panose="02000503000000020004" pitchFamily="2" charset="0"/>
-              </a:rPr>
-              <a:t>Cordycep</a:t>
-            </a:r>
-            <a:r>
-              <a:rPr lang="en-US" sz="1200" dirty="0">
-                <a:solidFill>
-                  <a:schemeClr val="bg1"/>
-                </a:solidFill>
-                <a:latin typeface="Lora" panose="02000503000000020004" pitchFamily="2" charset="0"/>
-              </a:rPr>
-              <a:t> fully taking over the host's body. They are tougher and stronger than simple Runners, often ambushing you by hiding inside buildings. The human inside likely lost the battle against the fungi, and its cries of struggle are slowly being replaced with a distinctive clicking noise.</a:t>
+              <a:t>Runners are humans recently infected by the Cordyceps fungus. They can quickly overwhelm you with their sheer speed and numbers but are exposed to attacks from weapons. You may hear them talking and struggling from within, with the soul of the host likely still present but unable to control their body.</a:t>
             </a:r>
           </a:p>
           <a:p>
@@ -3756,28 +3865,18 @@
           <a:p>
             <a:pPr algn="just"/>
             <a:r>
-              <a:rPr lang="fr-FR" sz="2000" b="0" i="0" dirty="0" err="1">
-                <a:solidFill>
-                  <a:srgbClr val="E6E600"/>
+              <a:rPr lang="fr-FR" sz="2000" b="0" i="0" dirty="0">
+                <a:solidFill>
+                  <a:srgbClr val="7AF300"/>
                 </a:solidFill>
                 <a:effectLst/>
                 <a:latin typeface="Algerian" panose="04020705040A02060702" pitchFamily="82" charset="0"/>
               </a:rPr>
-              <a:t>Stalkers</a:t>
-            </a:r>
-            <a:r>
-              <a:rPr lang="fr-FR" sz="2000" b="0" i="0" dirty="0">
-                <a:solidFill>
-                  <a:srgbClr val="E6E600"/>
-                </a:solidFill>
-                <a:effectLst/>
-                <a:latin typeface="Algerian" panose="04020705040A02060702" pitchFamily="82" charset="0"/>
-              </a:rPr>
-              <a:t> behavior</a:t>
+              <a:t>Runners behavior</a:t>
             </a:r>
             <a:endParaRPr lang="fr-FR" sz="2000" dirty="0">
               <a:solidFill>
-                <a:srgbClr val="E6E600"/>
+                <a:srgbClr val="7AF300"/>
               </a:solidFill>
               <a:latin typeface="Algerian" panose="04020705040A02060702" pitchFamily="82" charset="0"/>
             </a:endParaRPr>
@@ -3803,7 +3902,7 @@
                 </a:solidFill>
                 <a:latin typeface="Lora" panose="02000503000000020004" pitchFamily="2" charset="0"/>
               </a:rPr>
-              <a:t>Will hide inside buildings*</a:t>
+              <a:t>Tend to be in groups in the street, compared to other infected type that will hide inside buildings</a:t>
             </a:r>
           </a:p>
           <a:p>
@@ -3848,7 +3947,7 @@
                 </a:solidFill>
                 <a:latin typeface="Lora" panose="02000503000000020004" pitchFamily="2" charset="0"/>
               </a:rPr>
-              <a:t>Have a stronger than normal toughness and strength</a:t>
+              <a:t>Have normal human strength* and toughness* meaning they are fragile against attacks</a:t>
             </a:r>
           </a:p>
           <a:p>
@@ -3863,11 +3962,29 @@
                 </a:solidFill>
                 <a:latin typeface="Lora" panose="02000503000000020004" pitchFamily="2" charset="0"/>
               </a:rPr>
-              <a:t>Have high sensibility to fire*</a:t>
-            </a:r>
-          </a:p>
-          <a:p>
-            <a:pPr algn="just"/>
+              <a:t>The number is their strength, do not take them too lightly</a:t>
+            </a:r>
+          </a:p>
+          <a:p>
+            <a:pPr marL="171450" indent="-171450" algn="just">
+              <a:buFont typeface="Wingdings" panose="05000000000000000000" pitchFamily="2" charset="2"/>
+              <a:buChar char="v"/>
+            </a:pPr>
+            <a:r>
+              <a:rPr lang="en-US" sz="1200" dirty="0">
+                <a:solidFill>
+                  <a:schemeClr val="bg1"/>
+                </a:solidFill>
+                <a:latin typeface="Lora" panose="02000503000000020004" pitchFamily="2" charset="0"/>
+              </a:rPr>
+              <a:t>Have medium vulnerability to fire*</a:t>
+            </a:r>
+          </a:p>
+          <a:p>
+            <a:pPr marL="171450" indent="-171450" algn="just">
+              <a:buFont typeface="Wingdings" panose="05000000000000000000" pitchFamily="2" charset="2"/>
+              <a:buChar char="v"/>
+            </a:pPr>
             <a:endParaRPr lang="en-US" sz="1200" dirty="0">
               <a:solidFill>
                 <a:schemeClr val="bg1"/>
@@ -3902,153 +4019,12 @@
               <a:latin typeface="Lora" panose="02000503000000020004" pitchFamily="2" charset="0"/>
             </a:endParaRPr>
           </a:p>
-          <a:p>
-            <a:pPr algn="just"/>
-            <a:endParaRPr lang="fr-FR" sz="1200" dirty="0">
-              <a:solidFill>
-                <a:schemeClr val="bg1"/>
-              </a:solidFill>
-              <a:latin typeface="Lora" panose="02000503000000020004" pitchFamily="2" charset="0"/>
-            </a:endParaRPr>
-          </a:p>
-          <a:p>
-            <a:pPr algn="just"/>
-            <a:r>
-              <a:rPr lang="fr-FR" sz="2000" b="0" i="0" dirty="0" err="1">
-                <a:solidFill>
-                  <a:srgbClr val="E6E600"/>
-                </a:solidFill>
-                <a:effectLst/>
-                <a:latin typeface="Algerian" panose="04020705040A02060702" pitchFamily="82" charset="0"/>
-              </a:rPr>
-              <a:t>Stalkers</a:t>
-            </a:r>
-            <a:r>
-              <a:rPr lang="fr-FR" sz="2000" b="0" i="0" dirty="0">
-                <a:solidFill>
-                  <a:srgbClr val="E6E600"/>
-                </a:solidFill>
-                <a:effectLst/>
-                <a:latin typeface="Algerian" panose="04020705040A02060702" pitchFamily="82" charset="0"/>
-              </a:rPr>
-              <a:t> </a:t>
-            </a:r>
-            <a:r>
-              <a:rPr lang="fr-FR" sz="2000" b="0" i="0" dirty="0" err="1">
-                <a:solidFill>
-                  <a:srgbClr val="E6E600"/>
-                </a:solidFill>
-                <a:effectLst/>
-                <a:latin typeface="Algerian" panose="04020705040A02060702" pitchFamily="82" charset="0"/>
-              </a:rPr>
-              <a:t>visuals</a:t>
-            </a:r>
-            <a:endParaRPr lang="fr-FR" sz="2000" dirty="0">
-              <a:solidFill>
-                <a:srgbClr val="E6E600"/>
-              </a:solidFill>
-              <a:latin typeface="Algerian" panose="04020705040A02060702" pitchFamily="82" charset="0"/>
-            </a:endParaRPr>
-          </a:p>
-          <a:p>
-            <a:pPr algn="just"/>
-            <a:endParaRPr lang="fr-FR" sz="1200" dirty="0">
-              <a:solidFill>
-                <a:schemeClr val="bg1"/>
-              </a:solidFill>
-              <a:latin typeface="Lora" panose="02000503000000020004" pitchFamily="2" charset="0"/>
-            </a:endParaRPr>
-          </a:p>
-          <a:p>
-            <a:pPr marL="171450" indent="-171450" algn="just">
-              <a:buFont typeface="Wingdings" panose="05000000000000000000" pitchFamily="2" charset="2"/>
-              <a:buChar char="v"/>
-            </a:pPr>
-            <a:r>
-              <a:rPr lang="fr-FR" sz="1200" dirty="0">
-                <a:solidFill>
-                  <a:schemeClr val="bg1"/>
-                </a:solidFill>
-                <a:latin typeface="Lora" panose="02000503000000020004" pitchFamily="2" charset="0"/>
-              </a:rPr>
-              <a:t>Will have </a:t>
-            </a:r>
-            <a:r>
-              <a:rPr lang="fr-FR" sz="1200" dirty="0" err="1">
-                <a:solidFill>
-                  <a:schemeClr val="bg1"/>
-                </a:solidFill>
-                <a:latin typeface="Lora" panose="02000503000000020004" pitchFamily="2" charset="0"/>
-              </a:rPr>
-              <a:t>ragged</a:t>
-            </a:r>
-            <a:r>
-              <a:rPr lang="fr-FR" sz="1200" dirty="0">
-                <a:solidFill>
-                  <a:schemeClr val="bg1"/>
-                </a:solidFill>
-                <a:latin typeface="Lora" panose="02000503000000020004" pitchFamily="2" charset="0"/>
-              </a:rPr>
-              <a:t> </a:t>
-            </a:r>
-            <a:r>
-              <a:rPr lang="fr-FR" sz="1200" dirty="0" err="1">
-                <a:solidFill>
-                  <a:schemeClr val="bg1"/>
-                </a:solidFill>
-                <a:latin typeface="Lora" panose="02000503000000020004" pitchFamily="2" charset="0"/>
-              </a:rPr>
-              <a:t>clothings</a:t>
-            </a:r>
-            <a:r>
-              <a:rPr lang="fr-FR" sz="1200" dirty="0">
-                <a:solidFill>
-                  <a:schemeClr val="bg1"/>
-                </a:solidFill>
-                <a:latin typeface="Lora" panose="02000503000000020004" pitchFamily="2" charset="0"/>
-              </a:rPr>
-              <a:t>, </a:t>
-            </a:r>
-            <a:r>
-              <a:rPr lang="fr-FR" sz="1200" dirty="0" err="1">
-                <a:solidFill>
-                  <a:schemeClr val="bg1"/>
-                </a:solidFill>
-                <a:latin typeface="Lora" panose="02000503000000020004" pitchFamily="2" charset="0"/>
-              </a:rPr>
-              <a:t>half</a:t>
-            </a:r>
-            <a:r>
-              <a:rPr lang="fr-FR" sz="1200" dirty="0">
-                <a:solidFill>
-                  <a:schemeClr val="bg1"/>
-                </a:solidFill>
-                <a:latin typeface="Lora" panose="02000503000000020004" pitchFamily="2" charset="0"/>
-              </a:rPr>
-              <a:t> bloody and </a:t>
-            </a:r>
-            <a:r>
-              <a:rPr lang="fr-FR" sz="1200" dirty="0" err="1">
-                <a:solidFill>
-                  <a:schemeClr val="bg1"/>
-                </a:solidFill>
-                <a:latin typeface="Lora" panose="02000503000000020004" pitchFamily="2" charset="0"/>
-              </a:rPr>
-              <a:t>dirty</a:t>
-            </a:r>
-            <a:endParaRPr lang="fr-FR" sz="1200" dirty="0">
-              <a:solidFill>
-                <a:schemeClr val="bg1"/>
-              </a:solidFill>
-              <a:latin typeface="Lora" panose="02000503000000020004" pitchFamily="2" charset="0"/>
-            </a:endParaRPr>
-          </a:p>
         </p:txBody>
       </p:sp>
     </p:spTree>
     <p:extLst>
       <p:ext uri="{BB962C8B-B14F-4D97-AF65-F5344CB8AC3E}">
-        <p14:creationId xmlns:p14="http://schemas.microsoft.com/office/powerpoint/2010/main" val="2427875664"/>
+        <p14:creationId xmlns:p14="http://schemas.microsoft.com/office/powerpoint/2010/main" val="644460253"/>
       </p:ext>
     </p:extLst>
   </p:cSld>
@@ -4058,7 +4034,7 @@
 </p:sld>
 </file>
 
-<file path=ppt/slides/slide3.xml><?xml version="1.0" encoding="utf-8"?>
+<file path=ppt/slides/slide4.xml><?xml version="1.0" encoding="utf-8"?>
 <p:sld xmlns:a="http://schemas.openxmlformats.org/drawingml/2006/main" xmlns:r="http://schemas.openxmlformats.org/officeDocument/2006/relationships" xmlns:p="http://schemas.openxmlformats.org/presentationml/2006/main">
   <p:cSld>
     <p:spTree>
@@ -4144,7 +4120,7 @@
         <p:spPr>
           <a:xfrm>
             <a:off x="2770094" y="71717"/>
-            <a:ext cx="6651812" cy="5663089"/>
+            <a:ext cx="6651812" cy="4001095"/>
           </a:xfrm>
           <a:prstGeom prst="rect">
             <a:avLst/>
@@ -4165,7 +4141,25 @@
                 </a:solidFill>
                 <a:latin typeface="Lora" panose="02000503000000020004" pitchFamily="2" charset="0"/>
               </a:rPr>
-              <a:t>Clickers evolve from Stalkers into an even more dangerous state. Their inhuman strength makes them extremely perilous to approach; anyone too close could find themselves dead in mere seconds. The cries of struggle have long been replaced with a clicking noise, used to replace their lost eyes due to the Cordyceps eating through them. Fortunately, this alteration makes them slower than simple Runners and Stalkers. However, they will move in unpredictable ways their arms, catching you whenever they get close enough to you.</a:t>
+              <a:t>Stalkers evolve from Runners with the </a:t>
+            </a:r>
+            <a:r>
+              <a:rPr lang="en-US" sz="1200" dirty="0" err="1">
+                <a:solidFill>
+                  <a:schemeClr val="bg1"/>
+                </a:solidFill>
+                <a:latin typeface="Lora" panose="02000503000000020004" pitchFamily="2" charset="0"/>
+              </a:rPr>
+              <a:t>Cordycep</a:t>
+            </a:r>
+            <a:r>
+              <a:rPr lang="en-US" sz="1200" dirty="0">
+                <a:solidFill>
+                  <a:schemeClr val="bg1"/>
+                </a:solidFill>
+                <a:latin typeface="Lora" panose="02000503000000020004" pitchFamily="2" charset="0"/>
+              </a:rPr>
+              <a:t> fully taking over the host's body. They are tougher and stronger than simple Runners, often ambushing you by hiding inside buildings. The human inside likely lost the battle against the fungi, and its cries of struggle are slowly being replaced with a distinctive clicking noise.</a:t>
             </a:r>
           </a:p>
           <a:p>
@@ -4191,17 +4185,17 @@
             <a:r>
               <a:rPr lang="fr-FR" sz="2000" b="0" i="0" dirty="0" err="1">
                 <a:solidFill>
-                  <a:srgbClr val="DA6D00"/>
+                  <a:srgbClr val="E6E600"/>
                 </a:solidFill>
                 <a:effectLst/>
                 <a:latin typeface="Algerian" panose="04020705040A02060702" pitchFamily="82" charset="0"/>
               </a:rPr>
-              <a:t>Clickers</a:t>
+              <a:t>Stalkers</a:t>
             </a:r>
             <a:r>
               <a:rPr lang="fr-FR" sz="2000" b="0" i="0" dirty="0">
                 <a:solidFill>
-                  <a:srgbClr val="DA6D00"/>
+                  <a:srgbClr val="E6E600"/>
                 </a:solidFill>
                 <a:effectLst/>
                 <a:latin typeface="Algerian" panose="04020705040A02060702" pitchFamily="82" charset="0"/>
@@ -4210,10 +4204,94 @@
             </a:r>
             <a:endParaRPr lang="fr-FR" sz="2000" dirty="0">
               <a:solidFill>
-                <a:srgbClr val="DA6D00"/>
+                <a:srgbClr val="E6E600"/>
               </a:solidFill>
               <a:latin typeface="Algerian" panose="04020705040A02060702" pitchFamily="82" charset="0"/>
             </a:endParaRPr>
+          </a:p>
+          <a:p>
+            <a:pPr algn="just"/>
+            <a:endParaRPr lang="fr-FR" sz="1200" dirty="0">
+              <a:solidFill>
+                <a:schemeClr val="bg1"/>
+              </a:solidFill>
+              <a:latin typeface="Lora" panose="02000503000000020004" pitchFamily="2" charset="0"/>
+            </a:endParaRPr>
+          </a:p>
+          <a:p>
+            <a:pPr marL="171450" indent="-171450" algn="just">
+              <a:buFont typeface="Wingdings" panose="05000000000000000000" pitchFamily="2" charset="2"/>
+              <a:buChar char="v"/>
+            </a:pPr>
+            <a:r>
+              <a:rPr lang="en-US" sz="1200" dirty="0">
+                <a:solidFill>
+                  <a:schemeClr val="bg1"/>
+                </a:solidFill>
+                <a:latin typeface="Lora" panose="02000503000000020004" pitchFamily="2" charset="0"/>
+              </a:rPr>
+              <a:t>Will hide inside buildings*</a:t>
+            </a:r>
+          </a:p>
+          <a:p>
+            <a:pPr marL="171450" indent="-171450" algn="just">
+              <a:buFont typeface="Wingdings" panose="05000000000000000000" pitchFamily="2" charset="2"/>
+              <a:buChar char="v"/>
+            </a:pPr>
+            <a:r>
+              <a:rPr lang="en-US" sz="1200" dirty="0">
+                <a:solidFill>
+                  <a:schemeClr val="bg1"/>
+                </a:solidFill>
+                <a:latin typeface="Lora" panose="02000503000000020004" pitchFamily="2" charset="0"/>
+              </a:rPr>
+              <a:t>Sprinters*</a:t>
+            </a:r>
+          </a:p>
+          <a:p>
+            <a:pPr marL="171450" indent="-171450" algn="just">
+              <a:buFont typeface="Wingdings" panose="05000000000000000000" pitchFamily="2" charset="2"/>
+              <a:buChar char="v"/>
+            </a:pPr>
+            <a:r>
+              <a:rPr lang="en-US" sz="1200" dirty="0">
+                <a:solidFill>
+                  <a:schemeClr val="bg1"/>
+                </a:solidFill>
+                <a:latin typeface="Lora" panose="02000503000000020004" pitchFamily="2" charset="0"/>
+              </a:rPr>
+              <a:t>Can climb small fences*</a:t>
+            </a:r>
+          </a:p>
+          <a:p>
+            <a:pPr marL="171450" indent="-171450" algn="just">
+              <a:buFont typeface="Wingdings" panose="05000000000000000000" pitchFamily="2" charset="2"/>
+              <a:buChar char="v"/>
+            </a:pPr>
+            <a:r>
+              <a:rPr lang="en-US" sz="1200" dirty="0">
+                <a:solidFill>
+                  <a:schemeClr val="bg1"/>
+                </a:solidFill>
+                <a:latin typeface="Lora" panose="02000503000000020004" pitchFamily="2" charset="0"/>
+              </a:rPr>
+              <a:t>Have a stronger than normal toughness and strength</a:t>
+            </a:r>
+          </a:p>
+          <a:p>
+            <a:pPr marL="171450" indent="-171450" algn="just">
+              <a:buFont typeface="Wingdings" panose="05000000000000000000" pitchFamily="2" charset="2"/>
+              <a:buChar char="v"/>
+            </a:pPr>
+            <a:r>
+              <a:rPr lang="en-US" sz="1200" dirty="0">
+                <a:solidFill>
+                  <a:schemeClr val="bg1"/>
+                </a:solidFill>
+                <a:latin typeface="Lora" panose="02000503000000020004" pitchFamily="2" charset="0"/>
+              </a:rPr>
+              <a:t>Have high vulnerability to fire*</a:t>
+            </a:r>
           </a:p>
           <a:p>
             <a:pPr algn="just"/>
@@ -4225,165 +4303,6 @@
             </a:endParaRPr>
           </a:p>
           <a:p>
-            <a:pPr marL="171450" indent="-171450" algn="just">
-              <a:buFont typeface="Wingdings" panose="05000000000000000000" pitchFamily="2" charset="2"/>
-              <a:buChar char="v"/>
-            </a:pPr>
-            <a:r>
-              <a:rPr lang="en-US" sz="1200" dirty="0">
-                <a:solidFill>
-                  <a:schemeClr val="bg1"/>
-                </a:solidFill>
-                <a:latin typeface="Lora" panose="02000503000000020004" pitchFamily="2" charset="0"/>
-              </a:rPr>
-              <a:t>Will hide inside buildings*</a:t>
-            </a:r>
-          </a:p>
-          <a:p>
-            <a:pPr marL="171450" indent="-171450" algn="just">
-              <a:buFont typeface="Wingdings" panose="05000000000000000000" pitchFamily="2" charset="2"/>
-              <a:buChar char="v"/>
-            </a:pPr>
-            <a:r>
-              <a:rPr lang="en-US" sz="1200" dirty="0">
-                <a:solidFill>
-                  <a:schemeClr val="bg1"/>
-                </a:solidFill>
-                <a:latin typeface="Lora" panose="02000503000000020004" pitchFamily="2" charset="0"/>
-              </a:rPr>
-              <a:t>Can climb small fences</a:t>
-            </a:r>
-          </a:p>
-          <a:p>
-            <a:pPr marL="171450" indent="-171450" algn="just">
-              <a:buFont typeface="Wingdings" panose="05000000000000000000" pitchFamily="2" charset="2"/>
-              <a:buChar char="v"/>
-            </a:pPr>
-            <a:r>
-              <a:rPr lang="en-US" sz="1200" dirty="0">
-                <a:solidFill>
-                  <a:schemeClr val="bg1"/>
-                </a:solidFill>
-                <a:latin typeface="Lora" panose="02000503000000020004" pitchFamily="2" charset="0"/>
-              </a:rPr>
-              <a:t>Move slowly when have no targets but will rush towards their target</a:t>
-            </a:r>
-          </a:p>
-          <a:p>
-            <a:pPr marL="171450" indent="-171450" algn="just">
-              <a:buFont typeface="Wingdings" panose="05000000000000000000" pitchFamily="2" charset="2"/>
-              <a:buChar char="v"/>
-            </a:pPr>
-            <a:r>
-              <a:rPr lang="en-US" sz="1200" dirty="0">
-                <a:solidFill>
-                  <a:schemeClr val="bg1"/>
-                </a:solidFill>
-                <a:latin typeface="Lora" panose="02000503000000020004" pitchFamily="2" charset="0"/>
-              </a:rPr>
-              <a:t>Have inhuman strength and toughness. They will overpower you and one shot you*</a:t>
-            </a:r>
-          </a:p>
-          <a:p>
-            <a:pPr marL="171450" indent="-171450" algn="just">
-              <a:buFont typeface="Wingdings" panose="05000000000000000000" pitchFamily="2" charset="2"/>
-              <a:buChar char="v"/>
-            </a:pPr>
-            <a:r>
-              <a:rPr lang="en-US" sz="1200" dirty="0">
-                <a:solidFill>
-                  <a:schemeClr val="bg1"/>
-                </a:solidFill>
-                <a:latin typeface="Lora" panose="02000503000000020004" pitchFamily="2" charset="0"/>
-              </a:rPr>
-              <a:t>Have bad vision (Not blind yet, this will be worked on in future updates)</a:t>
-            </a:r>
-          </a:p>
-          <a:p>
-            <a:pPr marL="171450" indent="-171450" algn="just">
-              <a:buFont typeface="Wingdings" panose="05000000000000000000" pitchFamily="2" charset="2"/>
-              <a:buChar char="v"/>
-            </a:pPr>
-            <a:r>
-              <a:rPr lang="en-US" sz="1200" dirty="0">
-                <a:solidFill>
-                  <a:schemeClr val="bg1"/>
-                </a:solidFill>
-                <a:latin typeface="Lora" panose="02000503000000020004" pitchFamily="2" charset="0"/>
-              </a:rPr>
-              <a:t>Have higher HP* and should survive around 2 shotgun shells</a:t>
-            </a:r>
-          </a:p>
-          <a:p>
-            <a:pPr marL="171450" indent="-171450" algn="just">
-              <a:buFont typeface="Wingdings" panose="05000000000000000000" pitchFamily="2" charset="2"/>
-              <a:buChar char="v"/>
-            </a:pPr>
-            <a:r>
-              <a:rPr lang="en-US" sz="1200" dirty="0">
-                <a:solidFill>
-                  <a:schemeClr val="bg1"/>
-                </a:solidFill>
-                <a:latin typeface="Lora" panose="02000503000000020004" pitchFamily="2" charset="0"/>
-              </a:rPr>
-              <a:t>Have high sensibility to fire*</a:t>
-            </a:r>
-          </a:p>
-          <a:p>
-            <a:pPr marL="171450" indent="-171450" algn="just">
-              <a:buFont typeface="Wingdings" panose="05000000000000000000" pitchFamily="2" charset="2"/>
-              <a:buChar char="v"/>
-            </a:pPr>
-            <a:r>
-              <a:rPr lang="en-US" sz="1200" dirty="0">
-                <a:solidFill>
-                  <a:schemeClr val="bg1"/>
-                </a:solidFill>
-                <a:latin typeface="Lora" panose="02000503000000020004" pitchFamily="2" charset="0"/>
-              </a:rPr>
-              <a:t>Will take increased damage when set on fire*</a:t>
-            </a:r>
-          </a:p>
-          <a:p>
-            <a:pPr marL="171450" indent="-171450" algn="just">
-              <a:buFont typeface="Wingdings" panose="05000000000000000000" pitchFamily="2" charset="2"/>
-              <a:buChar char="v"/>
-            </a:pPr>
-            <a:r>
-              <a:rPr lang="en-US" sz="1200" dirty="0">
-                <a:solidFill>
-                  <a:schemeClr val="bg1"/>
-                </a:solidFill>
-                <a:latin typeface="Lora" panose="02000503000000020004" pitchFamily="2" charset="0"/>
-              </a:rPr>
-              <a:t>Cannot be pushed with hands*</a:t>
-            </a:r>
-          </a:p>
-          <a:p>
-            <a:pPr marL="171450" indent="-171450" algn="just">
-              <a:buFont typeface="Wingdings" panose="05000000000000000000" pitchFamily="2" charset="2"/>
-              <a:buChar char="v"/>
-            </a:pPr>
-            <a:r>
-              <a:rPr lang="en-US" sz="1200" dirty="0">
-                <a:solidFill>
-                  <a:schemeClr val="bg1"/>
-                </a:solidFill>
-                <a:latin typeface="Lora" panose="02000503000000020004" pitchFamily="2" charset="0"/>
-              </a:rPr>
-              <a:t>Will grab you* (off by default)</a:t>
-            </a:r>
-          </a:p>
-          <a:p>
-            <a:pPr algn="just"/>
-            <a:endParaRPr lang="en-US" sz="1200" dirty="0">
-              <a:solidFill>
-                <a:schemeClr val="bg1"/>
-              </a:solidFill>
-              <a:latin typeface="Lora" panose="02000503000000020004" pitchFamily="2" charset="0"/>
-            </a:endParaRPr>
-          </a:p>
-          <a:p>
             <a:pPr algn="just"/>
             <a:r>
               <a:rPr lang="en-US" sz="1000" i="1" dirty="0">
@@ -4424,17 +4343,17 @@
             <a:r>
               <a:rPr lang="fr-FR" sz="2000" b="0" i="0" dirty="0" err="1">
                 <a:solidFill>
-                  <a:srgbClr val="DA6D00"/>
+                  <a:srgbClr val="E6E600"/>
                 </a:solidFill>
                 <a:effectLst/>
                 <a:latin typeface="Algerian" panose="04020705040A02060702" pitchFamily="82" charset="0"/>
               </a:rPr>
-              <a:t>Clickers</a:t>
+              <a:t>Stalkers</a:t>
             </a:r>
             <a:r>
               <a:rPr lang="fr-FR" sz="2000" b="0" i="0" dirty="0">
                 <a:solidFill>
-                  <a:srgbClr val="DA6D00"/>
+                  <a:srgbClr val="E6E600"/>
                 </a:solidFill>
                 <a:effectLst/>
                 <a:latin typeface="Algerian" panose="04020705040A02060702" pitchFamily="82" charset="0"/>
@@ -4444,7 +4363,7 @@
             <a:r>
               <a:rPr lang="fr-FR" sz="2000" b="0" i="0" dirty="0" err="1">
                 <a:solidFill>
-                  <a:srgbClr val="DA6D00"/>
+                  <a:srgbClr val="E6E600"/>
                 </a:solidFill>
                 <a:effectLst/>
                 <a:latin typeface="Algerian" panose="04020705040A02060702" pitchFamily="82" charset="0"/>
@@ -4453,7 +4372,7 @@
             </a:r>
             <a:endParaRPr lang="fr-FR" sz="2000" dirty="0">
               <a:solidFill>
-                <a:srgbClr val="DA6D00"/>
+                <a:srgbClr val="E6E600"/>
               </a:solidFill>
               <a:latin typeface="Algerian" panose="04020705040A02060702" pitchFamily="82" charset="0"/>
             </a:endParaRPr>
@@ -4497,7 +4416,7 @@
                 </a:solidFill>
                 <a:latin typeface="Lora" panose="02000503000000020004" pitchFamily="2" charset="0"/>
               </a:rPr>
-              <a:t>, bloody and </a:t>
+              <a:t> </a:t>
             </a:r>
             <a:r>
               <a:rPr lang="fr-FR" sz="1200" dirty="0" err="1">
@@ -4506,25 +4425,43 @@
                 </a:solidFill>
                 <a:latin typeface="Lora" panose="02000503000000020004" pitchFamily="2" charset="0"/>
               </a:rPr>
+              <a:t>clothings</a:t>
+            </a:r>
+            <a:r>
+              <a:rPr lang="fr-FR" sz="1200" dirty="0">
+                <a:solidFill>
+                  <a:schemeClr val="bg1"/>
+                </a:solidFill>
+                <a:latin typeface="Lora" panose="02000503000000020004" pitchFamily="2" charset="0"/>
+              </a:rPr>
+              <a:t>, </a:t>
+            </a:r>
+            <a:r>
+              <a:rPr lang="fr-FR" sz="1200" dirty="0" err="1">
+                <a:solidFill>
+                  <a:schemeClr val="bg1"/>
+                </a:solidFill>
+                <a:latin typeface="Lora" panose="02000503000000020004" pitchFamily="2" charset="0"/>
+              </a:rPr>
+              <a:t>half</a:t>
+            </a:r>
+            <a:r>
+              <a:rPr lang="fr-FR" sz="1200" dirty="0">
+                <a:solidFill>
+                  <a:schemeClr val="bg1"/>
+                </a:solidFill>
+                <a:latin typeface="Lora" panose="02000503000000020004" pitchFamily="2" charset="0"/>
+              </a:rPr>
+              <a:t> bloody and </a:t>
+            </a:r>
+            <a:r>
+              <a:rPr lang="fr-FR" sz="1200" dirty="0" err="1">
+                <a:solidFill>
+                  <a:schemeClr val="bg1"/>
+                </a:solidFill>
+                <a:latin typeface="Lora" panose="02000503000000020004" pitchFamily="2" charset="0"/>
+              </a:rPr>
               <a:t>dirty</a:t>
-            </a:r>
-            <a:r>
-              <a:rPr lang="fr-FR" sz="1200" dirty="0">
-                <a:solidFill>
-                  <a:schemeClr val="bg1"/>
-                </a:solidFill>
-                <a:latin typeface="Lora" panose="02000503000000020004" pitchFamily="2" charset="0"/>
-              </a:rPr>
-              <a:t> </a:t>
-            </a:r>
-            <a:r>
-              <a:rPr lang="fr-FR" sz="1200" dirty="0" err="1">
-                <a:solidFill>
-                  <a:schemeClr val="bg1"/>
-                </a:solidFill>
-                <a:latin typeface="Lora" panose="02000503000000020004" pitchFamily="2" charset="0"/>
-              </a:rPr>
-              <a:t>clothings</a:t>
             </a:r>
             <a:endParaRPr lang="fr-FR" sz="1200" dirty="0">
               <a:solidFill>
@@ -4533,96 +4470,12 @@
               <a:latin typeface="Lora" panose="02000503000000020004" pitchFamily="2" charset="0"/>
             </a:endParaRPr>
           </a:p>
-          <a:p>
-            <a:pPr marL="171450" indent="-171450" algn="just">
-              <a:buFont typeface="Wingdings" panose="05000000000000000000" pitchFamily="2" charset="2"/>
-              <a:buChar char="v"/>
-            </a:pPr>
-            <a:r>
-              <a:rPr lang="fr-FR" sz="1200" dirty="0">
-                <a:solidFill>
-                  <a:schemeClr val="bg1"/>
-                </a:solidFill>
-                <a:latin typeface="Lora" panose="02000503000000020004" pitchFamily="2" charset="0"/>
-              </a:rPr>
-              <a:t>Custom model: 2 </a:t>
-            </a:r>
-            <a:r>
-              <a:rPr lang="fr-FR" sz="1200" dirty="0" err="1">
-                <a:solidFill>
-                  <a:schemeClr val="bg1"/>
-                </a:solidFill>
-                <a:latin typeface="Lora" panose="02000503000000020004" pitchFamily="2" charset="0"/>
-              </a:rPr>
-              <a:t>models</a:t>
-            </a:r>
-            <a:r>
-              <a:rPr lang="fr-FR" sz="1200" dirty="0">
-                <a:solidFill>
-                  <a:schemeClr val="bg1"/>
-                </a:solidFill>
-                <a:latin typeface="Lora" panose="02000503000000020004" pitchFamily="2" charset="0"/>
-              </a:rPr>
-              <a:t> </a:t>
-            </a:r>
-            <a:r>
-              <a:rPr lang="fr-FR" sz="1200" dirty="0" err="1">
-                <a:solidFill>
-                  <a:schemeClr val="bg1"/>
-                </a:solidFill>
-                <a:latin typeface="Lora" panose="02000503000000020004" pitchFamily="2" charset="0"/>
-              </a:rPr>
-              <a:t>with</a:t>
-            </a:r>
-            <a:r>
-              <a:rPr lang="fr-FR" sz="1200" dirty="0">
-                <a:solidFill>
-                  <a:schemeClr val="bg1"/>
-                </a:solidFill>
-                <a:latin typeface="Lora" panose="02000503000000020004" pitchFamily="2" charset="0"/>
-              </a:rPr>
-              <a:t> </a:t>
-            </a:r>
-            <a:r>
-              <a:rPr lang="fr-FR" sz="1200" dirty="0" err="1">
-                <a:solidFill>
-                  <a:schemeClr val="bg1"/>
-                </a:solidFill>
-                <a:latin typeface="Lora" panose="02000503000000020004" pitchFamily="2" charset="0"/>
-              </a:rPr>
-              <a:t>each</a:t>
-            </a:r>
-            <a:r>
-              <a:rPr lang="fr-FR" sz="1200" dirty="0">
-                <a:solidFill>
-                  <a:schemeClr val="bg1"/>
-                </a:solidFill>
-                <a:latin typeface="Lora" panose="02000503000000020004" pitchFamily="2" charset="0"/>
-              </a:rPr>
-              <a:t> 2 textures variations</a:t>
-            </a:r>
-          </a:p>
-          <a:p>
-            <a:pPr marL="171450" indent="-171450" algn="just">
-              <a:buFont typeface="Wingdings" panose="05000000000000000000" pitchFamily="2" charset="2"/>
-              <a:buChar char="v"/>
-            </a:pPr>
-            <a:r>
-              <a:rPr lang="fr-FR" sz="1200" dirty="0">
-                <a:solidFill>
-                  <a:schemeClr val="bg1"/>
-                </a:solidFill>
-                <a:latin typeface="Lora" panose="02000503000000020004" pitchFamily="2" charset="0"/>
-              </a:rPr>
-              <a:t>Custom animations (WIP)</a:t>
-            </a:r>
-          </a:p>
         </p:txBody>
       </p:sp>
     </p:spTree>
     <p:extLst>
       <p:ext uri="{BB962C8B-B14F-4D97-AF65-F5344CB8AC3E}">
-        <p14:creationId xmlns:p14="http://schemas.microsoft.com/office/powerpoint/2010/main" val="202313314"/>
+        <p14:creationId xmlns:p14="http://schemas.microsoft.com/office/powerpoint/2010/main" val="2427875664"/>
       </p:ext>
     </p:extLst>
   </p:cSld>
@@ -4632,7 +4485,7 @@
 </p:sld>
 </file>
 
-<file path=ppt/slides/slide4.xml><?xml version="1.0" encoding="utf-8"?>
+<file path=ppt/slides/slide5.xml><?xml version="1.0" encoding="utf-8"?>
 <p:sld xmlns:a="http://schemas.openxmlformats.org/drawingml/2006/main" xmlns:r="http://schemas.openxmlformats.org/officeDocument/2006/relationships" xmlns:p="http://schemas.openxmlformats.org/presentationml/2006/main">
   <p:cSld>
     <p:spTree>
@@ -4718,6 +4571,580 @@
         <p:spPr>
           <a:xfrm>
             <a:off x="2770094" y="71717"/>
+            <a:ext cx="6651812" cy="5663089"/>
+          </a:xfrm>
+          <a:prstGeom prst="rect">
+            <a:avLst/>
+          </a:prstGeom>
+          <a:noFill/>
+        </p:spPr>
+        <p:txBody>
+          <a:bodyPr wrap="square" rtlCol="0">
+            <a:spAutoFit/>
+          </a:bodyPr>
+          <a:lstStyle/>
+          <a:p>
+            <a:pPr algn="just"/>
+            <a:r>
+              <a:rPr lang="en-US" sz="1200" dirty="0">
+                <a:solidFill>
+                  <a:schemeClr val="bg1"/>
+                </a:solidFill>
+                <a:latin typeface="Lora" panose="02000503000000020004" pitchFamily="2" charset="0"/>
+              </a:rPr>
+              <a:t>Clickers evolve from Stalkers into an even more dangerous state. Their inhuman strength makes them extremely perilous to approach; anyone too close could find themselves dead in mere seconds. The cries of struggle have long been replaced with a clicking noise, used to replace their lost eyes due to the Cordyceps eating through them. Fortunately, this alteration makes them slower than simple Runners and Stalkers. However, they will move in unpredictable ways their arms, catching you whenever they get close enough to you.</a:t>
+            </a:r>
+          </a:p>
+          <a:p>
+            <a:pPr algn="just"/>
+            <a:endParaRPr lang="en-US" sz="1200" dirty="0">
+              <a:solidFill>
+                <a:schemeClr val="bg1"/>
+              </a:solidFill>
+              <a:latin typeface="Lora" panose="02000503000000020004" pitchFamily="2" charset="0"/>
+            </a:endParaRPr>
+          </a:p>
+          <a:p>
+            <a:pPr algn="just"/>
+            <a:endParaRPr lang="en-US" sz="1200" dirty="0">
+              <a:solidFill>
+                <a:schemeClr val="bg1"/>
+              </a:solidFill>
+              <a:latin typeface="Lora" panose="02000503000000020004" pitchFamily="2" charset="0"/>
+            </a:endParaRPr>
+          </a:p>
+          <a:p>
+            <a:pPr algn="just"/>
+            <a:r>
+              <a:rPr lang="fr-FR" sz="2000" b="0" i="0" dirty="0" err="1">
+                <a:solidFill>
+                  <a:srgbClr val="DA6D00"/>
+                </a:solidFill>
+                <a:effectLst/>
+                <a:latin typeface="Algerian" panose="04020705040A02060702" pitchFamily="82" charset="0"/>
+              </a:rPr>
+              <a:t>Clickers</a:t>
+            </a:r>
+            <a:r>
+              <a:rPr lang="fr-FR" sz="2000" b="0" i="0" dirty="0">
+                <a:solidFill>
+                  <a:srgbClr val="DA6D00"/>
+                </a:solidFill>
+                <a:effectLst/>
+                <a:latin typeface="Algerian" panose="04020705040A02060702" pitchFamily="82" charset="0"/>
+              </a:rPr>
+              <a:t> behavior</a:t>
+            </a:r>
+            <a:endParaRPr lang="fr-FR" sz="2000" dirty="0">
+              <a:solidFill>
+                <a:srgbClr val="DA6D00"/>
+              </a:solidFill>
+              <a:latin typeface="Algerian" panose="04020705040A02060702" pitchFamily="82" charset="0"/>
+            </a:endParaRPr>
+          </a:p>
+          <a:p>
+            <a:pPr algn="just"/>
+            <a:endParaRPr lang="en-US" sz="1200" dirty="0">
+              <a:solidFill>
+                <a:schemeClr val="bg1"/>
+              </a:solidFill>
+              <a:latin typeface="Lora" panose="02000503000000020004" pitchFamily="2" charset="0"/>
+            </a:endParaRPr>
+          </a:p>
+          <a:p>
+            <a:pPr marL="171450" indent="-171450" algn="just">
+              <a:buFont typeface="Wingdings" panose="05000000000000000000" pitchFamily="2" charset="2"/>
+              <a:buChar char="v"/>
+            </a:pPr>
+            <a:r>
+              <a:rPr lang="en-US" sz="1200" dirty="0">
+                <a:solidFill>
+                  <a:schemeClr val="bg1"/>
+                </a:solidFill>
+                <a:latin typeface="Lora" panose="02000503000000020004" pitchFamily="2" charset="0"/>
+              </a:rPr>
+              <a:t>Will hide inside buildings*</a:t>
+            </a:r>
+          </a:p>
+          <a:p>
+            <a:pPr marL="171450" indent="-171450" algn="just">
+              <a:buFont typeface="Wingdings" panose="05000000000000000000" pitchFamily="2" charset="2"/>
+              <a:buChar char="v"/>
+            </a:pPr>
+            <a:r>
+              <a:rPr lang="en-US" sz="1200" dirty="0">
+                <a:solidFill>
+                  <a:schemeClr val="bg1"/>
+                </a:solidFill>
+                <a:latin typeface="Lora" panose="02000503000000020004" pitchFamily="2" charset="0"/>
+              </a:rPr>
+              <a:t>Can climb small fences</a:t>
+            </a:r>
+          </a:p>
+          <a:p>
+            <a:pPr marL="171450" indent="-171450" algn="just">
+              <a:buFont typeface="Wingdings" panose="05000000000000000000" pitchFamily="2" charset="2"/>
+              <a:buChar char="v"/>
+            </a:pPr>
+            <a:r>
+              <a:rPr lang="en-US" sz="1200" dirty="0">
+                <a:solidFill>
+                  <a:schemeClr val="bg1"/>
+                </a:solidFill>
+                <a:latin typeface="Lora" panose="02000503000000020004" pitchFamily="2" charset="0"/>
+              </a:rPr>
+              <a:t>Move slowly when have no targets but will rush towards their target</a:t>
+            </a:r>
+          </a:p>
+          <a:p>
+            <a:pPr marL="171450" indent="-171450" algn="just">
+              <a:buFont typeface="Wingdings" panose="05000000000000000000" pitchFamily="2" charset="2"/>
+              <a:buChar char="v"/>
+            </a:pPr>
+            <a:r>
+              <a:rPr lang="en-US" sz="1200" dirty="0">
+                <a:solidFill>
+                  <a:schemeClr val="bg1"/>
+                </a:solidFill>
+                <a:latin typeface="Lora" panose="02000503000000020004" pitchFamily="2" charset="0"/>
+              </a:rPr>
+              <a:t>Have inhuman strength and toughness. They will overpower you and one shot you*</a:t>
+            </a:r>
+          </a:p>
+          <a:p>
+            <a:pPr marL="171450" indent="-171450" algn="just">
+              <a:buFont typeface="Wingdings" panose="05000000000000000000" pitchFamily="2" charset="2"/>
+              <a:buChar char="v"/>
+            </a:pPr>
+            <a:r>
+              <a:rPr lang="en-US" sz="1200" dirty="0">
+                <a:solidFill>
+                  <a:schemeClr val="bg1"/>
+                </a:solidFill>
+                <a:latin typeface="Lora" panose="02000503000000020004" pitchFamily="2" charset="0"/>
+              </a:rPr>
+              <a:t>Have bad vision (Not blind yet, this will be worked on in future updates)</a:t>
+            </a:r>
+          </a:p>
+          <a:p>
+            <a:pPr marL="171450" indent="-171450" algn="just">
+              <a:buFont typeface="Wingdings" panose="05000000000000000000" pitchFamily="2" charset="2"/>
+              <a:buChar char="v"/>
+            </a:pPr>
+            <a:r>
+              <a:rPr lang="en-US" sz="1200" dirty="0">
+                <a:solidFill>
+                  <a:schemeClr val="bg1"/>
+                </a:solidFill>
+                <a:latin typeface="Lora" panose="02000503000000020004" pitchFamily="2" charset="0"/>
+              </a:rPr>
+              <a:t>Have higher HP* and should survive around 2 shotgun shells</a:t>
+            </a:r>
+          </a:p>
+          <a:p>
+            <a:pPr marL="171450" indent="-171450" algn="just">
+              <a:buFont typeface="Wingdings" panose="05000000000000000000" pitchFamily="2" charset="2"/>
+              <a:buChar char="v"/>
+            </a:pPr>
+            <a:r>
+              <a:rPr lang="en-US" sz="1200" dirty="0">
+                <a:solidFill>
+                  <a:schemeClr val="bg1"/>
+                </a:solidFill>
+                <a:latin typeface="Lora" panose="02000503000000020004" pitchFamily="2" charset="0"/>
+              </a:rPr>
+              <a:t>Have high vulnerability to fire*</a:t>
+            </a:r>
+          </a:p>
+          <a:p>
+            <a:pPr marL="171450" indent="-171450" algn="just">
+              <a:buFont typeface="Wingdings" panose="05000000000000000000" pitchFamily="2" charset="2"/>
+              <a:buChar char="v"/>
+            </a:pPr>
+            <a:r>
+              <a:rPr lang="en-US" sz="1200" dirty="0">
+                <a:solidFill>
+                  <a:schemeClr val="bg1"/>
+                </a:solidFill>
+                <a:latin typeface="Lora" panose="02000503000000020004" pitchFamily="2" charset="0"/>
+              </a:rPr>
+              <a:t>Will take increased damage when set on fire*</a:t>
+            </a:r>
+          </a:p>
+          <a:p>
+            <a:pPr marL="171450" indent="-171450" algn="just">
+              <a:buFont typeface="Wingdings" panose="05000000000000000000" pitchFamily="2" charset="2"/>
+              <a:buChar char="v"/>
+            </a:pPr>
+            <a:r>
+              <a:rPr lang="en-US" sz="1200" dirty="0">
+                <a:solidFill>
+                  <a:schemeClr val="bg1"/>
+                </a:solidFill>
+                <a:latin typeface="Lora" panose="02000503000000020004" pitchFamily="2" charset="0"/>
+              </a:rPr>
+              <a:t>Cannot be pushed with hands*</a:t>
+            </a:r>
+          </a:p>
+          <a:p>
+            <a:pPr marL="171450" indent="-171450" algn="just">
+              <a:buFont typeface="Wingdings" panose="05000000000000000000" pitchFamily="2" charset="2"/>
+              <a:buChar char="v"/>
+            </a:pPr>
+            <a:r>
+              <a:rPr lang="en-US" sz="1200" dirty="0">
+                <a:solidFill>
+                  <a:schemeClr val="bg1"/>
+                </a:solidFill>
+                <a:latin typeface="Lora" panose="02000503000000020004" pitchFamily="2" charset="0"/>
+              </a:rPr>
+              <a:t>Will grab you* (off by default)</a:t>
+            </a:r>
+          </a:p>
+          <a:p>
+            <a:pPr algn="just"/>
+            <a:endParaRPr lang="en-US" sz="1200" dirty="0">
+              <a:solidFill>
+                <a:schemeClr val="bg1"/>
+              </a:solidFill>
+              <a:latin typeface="Lora" panose="02000503000000020004" pitchFamily="2" charset="0"/>
+            </a:endParaRPr>
+          </a:p>
+          <a:p>
+            <a:pPr algn="just"/>
+            <a:r>
+              <a:rPr lang="en-US" sz="1000" i="1" dirty="0">
+                <a:solidFill>
+                  <a:schemeClr val="bg1"/>
+                </a:solidFill>
+                <a:latin typeface="Lora" panose="02000503000000020004" pitchFamily="2" charset="0"/>
+              </a:rPr>
+              <a:t>* can be modified in the sandbox options</a:t>
+            </a:r>
+            <a:endParaRPr lang="fr-FR" sz="1000" i="1" dirty="0">
+              <a:solidFill>
+                <a:schemeClr val="bg1"/>
+              </a:solidFill>
+              <a:latin typeface="Lora" panose="02000503000000020004" pitchFamily="2" charset="0"/>
+            </a:endParaRPr>
+          </a:p>
+          <a:p>
+            <a:pPr algn="just"/>
+            <a:endParaRPr lang="fr-FR" sz="1200" dirty="0">
+              <a:solidFill>
+                <a:schemeClr val="bg1"/>
+              </a:solidFill>
+              <a:latin typeface="Lora" panose="02000503000000020004" pitchFamily="2" charset="0"/>
+            </a:endParaRPr>
+          </a:p>
+          <a:p>
+            <a:pPr algn="just"/>
+            <a:endParaRPr lang="fr-FR" sz="1200" dirty="0">
+              <a:solidFill>
+                <a:schemeClr val="bg1"/>
+              </a:solidFill>
+              <a:latin typeface="Lora" panose="02000503000000020004" pitchFamily="2" charset="0"/>
+            </a:endParaRPr>
+          </a:p>
+          <a:p>
+            <a:pPr algn="just"/>
+            <a:r>
+              <a:rPr lang="fr-FR" sz="2000" b="0" i="0" dirty="0" err="1">
+                <a:solidFill>
+                  <a:srgbClr val="DA6D00"/>
+                </a:solidFill>
+                <a:effectLst/>
+                <a:latin typeface="Algerian" panose="04020705040A02060702" pitchFamily="82" charset="0"/>
+              </a:rPr>
+              <a:t>Clickers</a:t>
+            </a:r>
+            <a:r>
+              <a:rPr lang="fr-FR" sz="2000" b="0" i="0" dirty="0">
+                <a:solidFill>
+                  <a:srgbClr val="DA6D00"/>
+                </a:solidFill>
+                <a:effectLst/>
+                <a:latin typeface="Algerian" panose="04020705040A02060702" pitchFamily="82" charset="0"/>
+              </a:rPr>
+              <a:t> </a:t>
+            </a:r>
+            <a:r>
+              <a:rPr lang="fr-FR" sz="2000" b="0" i="0" dirty="0" err="1">
+                <a:solidFill>
+                  <a:srgbClr val="DA6D00"/>
+                </a:solidFill>
+                <a:effectLst/>
+                <a:latin typeface="Algerian" panose="04020705040A02060702" pitchFamily="82" charset="0"/>
+              </a:rPr>
+              <a:t>visuals</a:t>
+            </a:r>
+            <a:endParaRPr lang="fr-FR" sz="2000" dirty="0">
+              <a:solidFill>
+                <a:srgbClr val="DA6D00"/>
+              </a:solidFill>
+              <a:latin typeface="Algerian" panose="04020705040A02060702" pitchFamily="82" charset="0"/>
+            </a:endParaRPr>
+          </a:p>
+          <a:p>
+            <a:pPr algn="just"/>
+            <a:endParaRPr lang="fr-FR" sz="1200" dirty="0">
+              <a:solidFill>
+                <a:schemeClr val="bg1"/>
+              </a:solidFill>
+              <a:latin typeface="Lora" panose="02000503000000020004" pitchFamily="2" charset="0"/>
+            </a:endParaRPr>
+          </a:p>
+          <a:p>
+            <a:pPr marL="171450" indent="-171450" algn="just">
+              <a:buFont typeface="Wingdings" panose="05000000000000000000" pitchFamily="2" charset="2"/>
+              <a:buChar char="v"/>
+            </a:pPr>
+            <a:r>
+              <a:rPr lang="fr-FR" sz="1200" dirty="0">
+                <a:solidFill>
+                  <a:schemeClr val="bg1"/>
+                </a:solidFill>
+                <a:latin typeface="Lora" panose="02000503000000020004" pitchFamily="2" charset="0"/>
+              </a:rPr>
+              <a:t>Will have </a:t>
+            </a:r>
+            <a:r>
+              <a:rPr lang="fr-FR" sz="1200" dirty="0" err="1">
+                <a:solidFill>
+                  <a:schemeClr val="bg1"/>
+                </a:solidFill>
+                <a:latin typeface="Lora" panose="02000503000000020004" pitchFamily="2" charset="0"/>
+              </a:rPr>
+              <a:t>ragged</a:t>
+            </a:r>
+            <a:r>
+              <a:rPr lang="fr-FR" sz="1200" dirty="0">
+                <a:solidFill>
+                  <a:schemeClr val="bg1"/>
+                </a:solidFill>
+                <a:latin typeface="Lora" panose="02000503000000020004" pitchFamily="2" charset="0"/>
+              </a:rPr>
+              <a:t>, bloody and </a:t>
+            </a:r>
+            <a:r>
+              <a:rPr lang="fr-FR" sz="1200" dirty="0" err="1">
+                <a:solidFill>
+                  <a:schemeClr val="bg1"/>
+                </a:solidFill>
+                <a:latin typeface="Lora" panose="02000503000000020004" pitchFamily="2" charset="0"/>
+              </a:rPr>
+              <a:t>dirty</a:t>
+            </a:r>
+            <a:r>
+              <a:rPr lang="fr-FR" sz="1200" dirty="0">
+                <a:solidFill>
+                  <a:schemeClr val="bg1"/>
+                </a:solidFill>
+                <a:latin typeface="Lora" panose="02000503000000020004" pitchFamily="2" charset="0"/>
+              </a:rPr>
+              <a:t> </a:t>
+            </a:r>
+            <a:r>
+              <a:rPr lang="fr-FR" sz="1200" dirty="0" err="1">
+                <a:solidFill>
+                  <a:schemeClr val="bg1"/>
+                </a:solidFill>
+                <a:latin typeface="Lora" panose="02000503000000020004" pitchFamily="2" charset="0"/>
+              </a:rPr>
+              <a:t>clothings</a:t>
+            </a:r>
+            <a:endParaRPr lang="fr-FR" sz="1200" dirty="0">
+              <a:solidFill>
+                <a:schemeClr val="bg1"/>
+              </a:solidFill>
+              <a:latin typeface="Lora" panose="02000503000000020004" pitchFamily="2" charset="0"/>
+            </a:endParaRPr>
+          </a:p>
+          <a:p>
+            <a:pPr marL="171450" indent="-171450" algn="just">
+              <a:buFont typeface="Wingdings" panose="05000000000000000000" pitchFamily="2" charset="2"/>
+              <a:buChar char="v"/>
+            </a:pPr>
+            <a:r>
+              <a:rPr lang="fr-FR" sz="1200" dirty="0">
+                <a:solidFill>
+                  <a:schemeClr val="bg1"/>
+                </a:solidFill>
+                <a:latin typeface="Lora" panose="02000503000000020004" pitchFamily="2" charset="0"/>
+              </a:rPr>
+              <a:t>Custom model: 2 </a:t>
+            </a:r>
+            <a:r>
+              <a:rPr lang="fr-FR" sz="1200" dirty="0" err="1">
+                <a:solidFill>
+                  <a:schemeClr val="bg1"/>
+                </a:solidFill>
+                <a:latin typeface="Lora" panose="02000503000000020004" pitchFamily="2" charset="0"/>
+              </a:rPr>
+              <a:t>models</a:t>
+            </a:r>
+            <a:r>
+              <a:rPr lang="fr-FR" sz="1200" dirty="0">
+                <a:solidFill>
+                  <a:schemeClr val="bg1"/>
+                </a:solidFill>
+                <a:latin typeface="Lora" panose="02000503000000020004" pitchFamily="2" charset="0"/>
+              </a:rPr>
+              <a:t> </a:t>
+            </a:r>
+            <a:r>
+              <a:rPr lang="fr-FR" sz="1200" dirty="0" err="1">
+                <a:solidFill>
+                  <a:schemeClr val="bg1"/>
+                </a:solidFill>
+                <a:latin typeface="Lora" panose="02000503000000020004" pitchFamily="2" charset="0"/>
+              </a:rPr>
+              <a:t>with</a:t>
+            </a:r>
+            <a:r>
+              <a:rPr lang="fr-FR" sz="1200" dirty="0">
+                <a:solidFill>
+                  <a:schemeClr val="bg1"/>
+                </a:solidFill>
+                <a:latin typeface="Lora" panose="02000503000000020004" pitchFamily="2" charset="0"/>
+              </a:rPr>
+              <a:t> </a:t>
+            </a:r>
+            <a:r>
+              <a:rPr lang="fr-FR" sz="1200" dirty="0" err="1">
+                <a:solidFill>
+                  <a:schemeClr val="bg1"/>
+                </a:solidFill>
+                <a:latin typeface="Lora" panose="02000503000000020004" pitchFamily="2" charset="0"/>
+              </a:rPr>
+              <a:t>each</a:t>
+            </a:r>
+            <a:r>
+              <a:rPr lang="fr-FR" sz="1200" dirty="0">
+                <a:solidFill>
+                  <a:schemeClr val="bg1"/>
+                </a:solidFill>
+                <a:latin typeface="Lora" panose="02000503000000020004" pitchFamily="2" charset="0"/>
+              </a:rPr>
+              <a:t> 2 textures variations</a:t>
+            </a:r>
+          </a:p>
+          <a:p>
+            <a:pPr marL="171450" indent="-171450" algn="just">
+              <a:buFont typeface="Wingdings" panose="05000000000000000000" pitchFamily="2" charset="2"/>
+              <a:buChar char="v"/>
+            </a:pPr>
+            <a:r>
+              <a:rPr lang="fr-FR" sz="1200" dirty="0">
+                <a:solidFill>
+                  <a:schemeClr val="bg1"/>
+                </a:solidFill>
+                <a:latin typeface="Lora" panose="02000503000000020004" pitchFamily="2" charset="0"/>
+              </a:rPr>
+              <a:t>Custom animations (WIP)</a:t>
+            </a:r>
+          </a:p>
+        </p:txBody>
+      </p:sp>
+    </p:spTree>
+    <p:extLst>
+      <p:ext uri="{BB962C8B-B14F-4D97-AF65-F5344CB8AC3E}">
+        <p14:creationId xmlns:p14="http://schemas.microsoft.com/office/powerpoint/2010/main" val="202313314"/>
+      </p:ext>
+    </p:extLst>
+  </p:cSld>
+  <p:clrMapOvr>
+    <a:masterClrMapping/>
+  </p:clrMapOvr>
+</p:sld>
+</file>
+
+<file path=ppt/slides/slide6.xml><?xml version="1.0" encoding="utf-8"?>
+<p:sld xmlns:a="http://schemas.openxmlformats.org/drawingml/2006/main" xmlns:r="http://schemas.openxmlformats.org/officeDocument/2006/relationships" xmlns:p="http://schemas.openxmlformats.org/presentationml/2006/main">
+  <p:cSld>
+    <p:spTree>
+      <p:nvGrpSpPr>
+        <p:cNvPr id="1" name=""/>
+        <p:cNvGrpSpPr/>
+        <p:nvPr/>
+      </p:nvGrpSpPr>
+      <p:grpSpPr>
+        <a:xfrm>
+          <a:off x="0" y="0"/>
+          <a:ext cx="0" cy="0"/>
+          <a:chOff x="0" y="0"/>
+          <a:chExt cx="0" cy="0"/>
+        </a:xfrm>
+      </p:grpSpPr>
+      <p:sp>
+        <p:nvSpPr>
+          <p:cNvPr id="10" name="Rectangle 9">
+            <a:extLst>
+              <a:ext uri="{FF2B5EF4-FFF2-40B4-BE49-F238E27FC236}">
+                <a16:creationId xmlns:a16="http://schemas.microsoft.com/office/drawing/2014/main" id="{9BBEE65E-F9CD-1198-2A6C-C20614132864}"/>
+              </a:ext>
+            </a:extLst>
+          </p:cNvPr>
+          <p:cNvSpPr/>
+          <p:nvPr/>
+        </p:nvSpPr>
+        <p:spPr>
+          <a:xfrm>
+            <a:off x="2667000" y="0"/>
+            <a:ext cx="6858000" cy="6858000"/>
+          </a:xfrm>
+          <a:prstGeom prst="rect">
+            <a:avLst/>
+          </a:prstGeom>
+          <a:solidFill>
+            <a:srgbClr val="1B2838"/>
+          </a:solidFill>
+          <a:ln>
+            <a:solidFill>
+              <a:srgbClr val="1B2838"/>
+            </a:solidFill>
+          </a:ln>
+        </p:spPr>
+        <p:style>
+          <a:lnRef idx="2">
+            <a:schemeClr val="accent1">
+              <a:shade val="15000"/>
+            </a:schemeClr>
+          </a:lnRef>
+          <a:fillRef idx="1">
+            <a:schemeClr val="accent1"/>
+          </a:fillRef>
+          <a:effectRef idx="0">
+            <a:schemeClr val="accent1"/>
+          </a:effectRef>
+          <a:fontRef idx="minor">
+            <a:schemeClr val="lt1"/>
+          </a:fontRef>
+        </p:style>
+        <p:txBody>
+          <a:bodyPr rtlCol="0" anchor="ctr"/>
+          <a:lstStyle/>
+          <a:p>
+            <a:pPr algn="ctr"/>
+            <a:endParaRPr lang="fr-FR" dirty="0"/>
+          </a:p>
+        </p:txBody>
+      </p:sp>
+      <p:sp>
+        <p:nvSpPr>
+          <p:cNvPr id="5" name="ZoneTexte 4">
+            <a:extLst>
+              <a:ext uri="{FF2B5EF4-FFF2-40B4-BE49-F238E27FC236}">
+                <a16:creationId xmlns:a16="http://schemas.microsoft.com/office/drawing/2014/main" id="{578D9BE6-39AC-1F3D-6451-6F5869E6F244}"/>
+              </a:ext>
+            </a:extLst>
+          </p:cNvPr>
+          <p:cNvSpPr txBox="1"/>
+          <p:nvPr/>
+        </p:nvSpPr>
+        <p:spPr>
+          <a:xfrm>
+            <a:off x="2770094" y="71717"/>
             <a:ext cx="6651812" cy="5478423"/>
           </a:xfrm>
           <a:prstGeom prst="rect">
@@ -4933,7 +5360,7 @@
                 </a:solidFill>
                 <a:latin typeface="Lora" panose="02000503000000020004" pitchFamily="2" charset="0"/>
               </a:rPr>
-              <a:t>Have high sensibility to fire*</a:t>
+              <a:t>Have high vulnerability to fire*</a:t>
             </a:r>
           </a:p>
           <a:p>

</xml_diff>

<commit_message>
Update workshop page TLOU Infected.pptx
</commit_message>
<xml_diff>
--- a/images/workshop page/workshop page TLOU Infected.pptx
+++ b/images/workshop page/workshop page TLOU Infected.pptx
@@ -11,6 +11,8 @@
     <p:sldId id="257" r:id="rId5"/>
     <p:sldId id="258" r:id="rId6"/>
     <p:sldId id="259" r:id="rId7"/>
+    <p:sldId id="262" r:id="rId8"/>
+    <p:sldId id="263" r:id="rId9"/>
   </p:sldIdLst>
   <p:sldSz cx="12192000" cy="6858000"/>
   <p:notesSz cx="6858000" cy="9144000"/>
@@ -5546,6 +5548,821 @@
 </p:sld>
 </file>
 
+<file path=ppt/slides/slide7.xml><?xml version="1.0" encoding="utf-8"?>
+<p:sld xmlns:a="http://schemas.openxmlformats.org/drawingml/2006/main" xmlns:r="http://schemas.openxmlformats.org/officeDocument/2006/relationships" xmlns:p="http://schemas.openxmlformats.org/presentationml/2006/main">
+  <p:cSld>
+    <p:spTree>
+      <p:nvGrpSpPr>
+        <p:cNvPr id="1" name=""/>
+        <p:cNvGrpSpPr/>
+        <p:nvPr/>
+      </p:nvGrpSpPr>
+      <p:grpSpPr>
+        <a:xfrm>
+          <a:off x="0" y="0"/>
+          <a:ext cx="0" cy="0"/>
+          <a:chOff x="0" y="0"/>
+          <a:chExt cx="0" cy="0"/>
+        </a:xfrm>
+      </p:grpSpPr>
+      <p:pic>
+        <p:nvPicPr>
+          <p:cNvPr id="5" name="Image 4">
+            <a:extLst>
+              <a:ext uri="{FF2B5EF4-FFF2-40B4-BE49-F238E27FC236}">
+                <a16:creationId xmlns:a16="http://schemas.microsoft.com/office/drawing/2014/main" id="{B3E1A0BB-825A-ECE5-2794-620A6AED242C}"/>
+              </a:ext>
+            </a:extLst>
+          </p:cNvPr>
+          <p:cNvPicPr>
+            <a:picLocks noChangeAspect="1"/>
+          </p:cNvPicPr>
+          <p:nvPr/>
+        </p:nvPicPr>
+        <p:blipFill>
+          <a:blip r:embed="rId2">
+            <a:extLst>
+              <a:ext uri="{28A0092B-C50C-407E-A947-70E740481C1C}">
+                <a14:useLocalDpi xmlns:a14="http://schemas.microsoft.com/office/drawing/2010/main" val="0"/>
+              </a:ext>
+            </a:extLst>
+          </a:blip>
+          <a:stretch>
+            <a:fillRect/>
+          </a:stretch>
+        </p:blipFill>
+        <p:spPr>
+          <a:xfrm>
+            <a:off x="0" y="0"/>
+            <a:ext cx="12191999" cy="6858000"/>
+          </a:xfrm>
+          <a:prstGeom prst="rect">
+            <a:avLst/>
+          </a:prstGeom>
+        </p:spPr>
+      </p:pic>
+      <p:cxnSp>
+        <p:nvCxnSpPr>
+          <p:cNvPr id="7" name="Connecteur droit avec flèche 6">
+            <a:extLst>
+              <a:ext uri="{FF2B5EF4-FFF2-40B4-BE49-F238E27FC236}">
+                <a16:creationId xmlns:a16="http://schemas.microsoft.com/office/drawing/2014/main" id="{82B0950C-112C-F564-EDDE-41797EFBA043}"/>
+              </a:ext>
+            </a:extLst>
+          </p:cNvPr>
+          <p:cNvCxnSpPr>
+            <a:cxnSpLocks/>
+            <a:stCxn id="9" idx="1"/>
+          </p:cNvCxnSpPr>
+          <p:nvPr/>
+        </p:nvCxnSpPr>
+        <p:spPr>
+          <a:xfrm flipH="1">
+            <a:off x="5289550" y="1140798"/>
+            <a:ext cx="1144588" cy="0"/>
+          </a:xfrm>
+          <a:prstGeom prst="straightConnector1">
+            <a:avLst/>
+          </a:prstGeom>
+          <a:ln w="38100">
+            <a:solidFill>
+              <a:srgbClr val="FF0000"/>
+            </a:solidFill>
+            <a:tailEnd type="triangle"/>
+          </a:ln>
+        </p:spPr>
+        <p:style>
+          <a:lnRef idx="2">
+            <a:schemeClr val="accent1"/>
+          </a:lnRef>
+          <a:fillRef idx="0">
+            <a:schemeClr val="accent1"/>
+          </a:fillRef>
+          <a:effectRef idx="1">
+            <a:schemeClr val="accent1"/>
+          </a:effectRef>
+          <a:fontRef idx="minor">
+            <a:schemeClr val="tx1"/>
+          </a:fontRef>
+        </p:style>
+      </p:cxnSp>
+      <p:sp>
+        <p:nvSpPr>
+          <p:cNvPr id="9" name="ZoneTexte 8">
+            <a:extLst>
+              <a:ext uri="{FF2B5EF4-FFF2-40B4-BE49-F238E27FC236}">
+                <a16:creationId xmlns:a16="http://schemas.microsoft.com/office/drawing/2014/main" id="{A7A3BD64-0F53-EB1F-44C8-8516E616A44E}"/>
+              </a:ext>
+            </a:extLst>
+          </p:cNvPr>
+          <p:cNvSpPr txBox="1"/>
+          <p:nvPr/>
+        </p:nvSpPr>
+        <p:spPr>
+          <a:xfrm>
+            <a:off x="6434138" y="986909"/>
+            <a:ext cx="2430462" cy="307777"/>
+          </a:xfrm>
+          <a:prstGeom prst="rect">
+            <a:avLst/>
+          </a:prstGeom>
+          <a:solidFill>
+            <a:srgbClr val="FFFFFF">
+              <a:alpha val="60000"/>
+            </a:srgbClr>
+          </a:solidFill>
+        </p:spPr>
+        <p:txBody>
+          <a:bodyPr wrap="square" rtlCol="0">
+            <a:spAutoFit/>
+          </a:bodyPr>
+          <a:lstStyle/>
+          <a:p>
+            <a:pPr algn="ctr"/>
+            <a:r>
+              <a:rPr lang="fr-FR" sz="1400" b="1" dirty="0" err="1">
+                <a:solidFill>
+                  <a:srgbClr val="FF0000"/>
+                </a:solidFill>
+                <a:latin typeface="Lora" panose="02000503000000020004" pitchFamily="2" charset="0"/>
+              </a:rPr>
+              <a:t>Allow</a:t>
+            </a:r>
+            <a:r>
+              <a:rPr lang="fr-FR" sz="1400" b="1" dirty="0">
+                <a:solidFill>
+                  <a:srgbClr val="FF0000"/>
+                </a:solidFill>
+                <a:latin typeface="Lora" panose="02000503000000020004" pitchFamily="2" charset="0"/>
+              </a:rPr>
+              <a:t> </a:t>
+            </a:r>
+            <a:r>
+              <a:rPr lang="fr-FR" sz="1400" b="1" dirty="0" err="1">
+                <a:solidFill>
+                  <a:srgbClr val="FF0000"/>
+                </a:solidFill>
+                <a:latin typeface="Lora" panose="02000503000000020004" pitchFamily="2" charset="0"/>
+              </a:rPr>
+              <a:t>nametags</a:t>
+            </a:r>
+            <a:r>
+              <a:rPr lang="fr-FR" sz="1400" b="1" dirty="0">
+                <a:solidFill>
+                  <a:srgbClr val="FF0000"/>
+                </a:solidFill>
+                <a:latin typeface="Lora" panose="02000503000000020004" pitchFamily="2" charset="0"/>
+              </a:rPr>
+              <a:t> for </a:t>
+            </a:r>
+            <a:r>
+              <a:rPr lang="fr-FR" sz="1400" b="1" dirty="0" err="1">
+                <a:solidFill>
+                  <a:srgbClr val="FF0000"/>
+                </a:solidFill>
+                <a:latin typeface="Lora" panose="02000503000000020004" pitchFamily="2" charset="0"/>
+              </a:rPr>
+              <a:t>players</a:t>
+            </a:r>
+            <a:endParaRPr lang="fr-FR" sz="1400" b="1" dirty="0">
+              <a:solidFill>
+                <a:srgbClr val="FF0000"/>
+              </a:solidFill>
+              <a:latin typeface="Lora" panose="02000503000000020004" pitchFamily="2" charset="0"/>
+            </a:endParaRPr>
+          </a:p>
+        </p:txBody>
+      </p:sp>
+      <p:cxnSp>
+        <p:nvCxnSpPr>
+          <p:cNvPr id="16" name="Connecteur droit avec flèche 15">
+            <a:extLst>
+              <a:ext uri="{FF2B5EF4-FFF2-40B4-BE49-F238E27FC236}">
+                <a16:creationId xmlns:a16="http://schemas.microsoft.com/office/drawing/2014/main" id="{41550915-E6DF-BBE5-7A9F-86D63FB858CA}"/>
+              </a:ext>
+            </a:extLst>
+          </p:cNvPr>
+          <p:cNvCxnSpPr>
+            <a:cxnSpLocks/>
+            <a:stCxn id="17" idx="3"/>
+          </p:cNvCxnSpPr>
+          <p:nvPr/>
+        </p:nvCxnSpPr>
+        <p:spPr>
+          <a:xfrm>
+            <a:off x="3070879" y="1359864"/>
+            <a:ext cx="479355" cy="0"/>
+          </a:xfrm>
+          <a:prstGeom prst="straightConnector1">
+            <a:avLst/>
+          </a:prstGeom>
+          <a:ln w="38100">
+            <a:solidFill>
+              <a:srgbClr val="FF0000"/>
+            </a:solidFill>
+            <a:tailEnd type="triangle"/>
+          </a:ln>
+        </p:spPr>
+        <p:style>
+          <a:lnRef idx="2">
+            <a:schemeClr val="accent1"/>
+          </a:lnRef>
+          <a:fillRef idx="0">
+            <a:schemeClr val="accent1"/>
+          </a:fillRef>
+          <a:effectRef idx="1">
+            <a:schemeClr val="accent1"/>
+          </a:effectRef>
+          <a:fontRef idx="minor">
+            <a:schemeClr val="tx1"/>
+          </a:fontRef>
+        </p:style>
+      </p:cxnSp>
+      <p:sp>
+        <p:nvSpPr>
+          <p:cNvPr id="17" name="ZoneTexte 16">
+            <a:extLst>
+              <a:ext uri="{FF2B5EF4-FFF2-40B4-BE49-F238E27FC236}">
+                <a16:creationId xmlns:a16="http://schemas.microsoft.com/office/drawing/2014/main" id="{23042115-6CC0-2C3A-6755-008A90D327DE}"/>
+              </a:ext>
+            </a:extLst>
+          </p:cNvPr>
+          <p:cNvSpPr txBox="1"/>
+          <p:nvPr/>
+        </p:nvSpPr>
+        <p:spPr>
+          <a:xfrm>
+            <a:off x="640417" y="1098254"/>
+            <a:ext cx="2430462" cy="523220"/>
+          </a:xfrm>
+          <a:prstGeom prst="rect">
+            <a:avLst/>
+          </a:prstGeom>
+          <a:solidFill>
+            <a:srgbClr val="FFFFFF">
+              <a:alpha val="60000"/>
+            </a:srgbClr>
+          </a:solidFill>
+        </p:spPr>
+        <p:txBody>
+          <a:bodyPr wrap="square" rtlCol="0">
+            <a:spAutoFit/>
+          </a:bodyPr>
+          <a:lstStyle/>
+          <a:p>
+            <a:pPr algn="ctr"/>
+            <a:r>
+              <a:rPr lang="fr-FR" sz="1400" b="1" dirty="0" err="1">
+                <a:solidFill>
+                  <a:srgbClr val="FF0000"/>
+                </a:solidFill>
+                <a:latin typeface="Lora" panose="02000503000000020004" pitchFamily="2" charset="0"/>
+              </a:rPr>
+              <a:t>Allow</a:t>
+            </a:r>
+            <a:r>
+              <a:rPr lang="fr-FR" sz="1400" b="1" dirty="0">
+                <a:solidFill>
+                  <a:srgbClr val="FF0000"/>
+                </a:solidFill>
+                <a:latin typeface="Lora" panose="02000503000000020004" pitchFamily="2" charset="0"/>
+              </a:rPr>
+              <a:t> </a:t>
+            </a:r>
+            <a:r>
+              <a:rPr lang="fr-FR" sz="1400" b="1" dirty="0" err="1">
+                <a:solidFill>
+                  <a:srgbClr val="FF0000"/>
+                </a:solidFill>
+                <a:latin typeface="Lora" panose="02000503000000020004" pitchFamily="2" charset="0"/>
+              </a:rPr>
+              <a:t>nametags</a:t>
+            </a:r>
+            <a:r>
+              <a:rPr lang="fr-FR" sz="1400" b="1" dirty="0">
+                <a:solidFill>
+                  <a:srgbClr val="FF0000"/>
+                </a:solidFill>
+                <a:latin typeface="Lora" panose="02000503000000020004" pitchFamily="2" charset="0"/>
+              </a:rPr>
+              <a:t> </a:t>
+            </a:r>
+            <a:r>
+              <a:rPr lang="fr-FR" sz="1400" b="1" dirty="0" err="1">
+                <a:solidFill>
+                  <a:srgbClr val="FF0000"/>
+                </a:solidFill>
+                <a:latin typeface="Lora" panose="02000503000000020004" pitchFamily="2" charset="0"/>
+              </a:rPr>
+              <a:t>always</a:t>
+            </a:r>
+            <a:r>
+              <a:rPr lang="fr-FR" sz="1400" b="1" dirty="0">
+                <a:solidFill>
+                  <a:srgbClr val="FF0000"/>
+                </a:solidFill>
+                <a:latin typeface="Lora" panose="02000503000000020004" pitchFamily="2" charset="0"/>
+              </a:rPr>
+              <a:t> on for </a:t>
+            </a:r>
+            <a:r>
+              <a:rPr lang="fr-FR" sz="1400" b="1" dirty="0" err="1">
+                <a:solidFill>
+                  <a:srgbClr val="FF0000"/>
+                </a:solidFill>
+                <a:latin typeface="Lora" panose="02000503000000020004" pitchFamily="2" charset="0"/>
+              </a:rPr>
+              <a:t>players</a:t>
+            </a:r>
+            <a:endParaRPr lang="fr-FR" sz="1400" b="1" dirty="0">
+              <a:solidFill>
+                <a:srgbClr val="FF0000"/>
+              </a:solidFill>
+              <a:latin typeface="Lora" panose="02000503000000020004" pitchFamily="2" charset="0"/>
+            </a:endParaRPr>
+          </a:p>
+        </p:txBody>
+      </p:sp>
+      <p:cxnSp>
+        <p:nvCxnSpPr>
+          <p:cNvPr id="21" name="Connecteur droit avec flèche 20">
+            <a:extLst>
+              <a:ext uri="{FF2B5EF4-FFF2-40B4-BE49-F238E27FC236}">
+                <a16:creationId xmlns:a16="http://schemas.microsoft.com/office/drawing/2014/main" id="{35675656-E9CA-788D-A0EE-E4D54ADF7310}"/>
+              </a:ext>
+            </a:extLst>
+          </p:cNvPr>
+          <p:cNvCxnSpPr>
+            <a:cxnSpLocks/>
+            <a:stCxn id="22" idx="1"/>
+          </p:cNvCxnSpPr>
+          <p:nvPr/>
+        </p:nvCxnSpPr>
+        <p:spPr>
+          <a:xfrm flipH="1">
+            <a:off x="5289550" y="1534261"/>
+            <a:ext cx="1144587" cy="0"/>
+          </a:xfrm>
+          <a:prstGeom prst="straightConnector1">
+            <a:avLst/>
+          </a:prstGeom>
+          <a:ln w="38100">
+            <a:solidFill>
+              <a:srgbClr val="FF0000"/>
+            </a:solidFill>
+            <a:tailEnd type="triangle"/>
+          </a:ln>
+        </p:spPr>
+        <p:style>
+          <a:lnRef idx="2">
+            <a:schemeClr val="accent1"/>
+          </a:lnRef>
+          <a:fillRef idx="0">
+            <a:schemeClr val="accent1"/>
+          </a:fillRef>
+          <a:effectRef idx="1">
+            <a:schemeClr val="accent1"/>
+          </a:effectRef>
+          <a:fontRef idx="minor">
+            <a:schemeClr val="tx1"/>
+          </a:fontRef>
+        </p:style>
+      </p:cxnSp>
+      <p:sp>
+        <p:nvSpPr>
+          <p:cNvPr id="22" name="ZoneTexte 21">
+            <a:extLst>
+              <a:ext uri="{FF2B5EF4-FFF2-40B4-BE49-F238E27FC236}">
+                <a16:creationId xmlns:a16="http://schemas.microsoft.com/office/drawing/2014/main" id="{28269597-1885-1A14-A2BA-30F154167FD6}"/>
+              </a:ext>
+            </a:extLst>
+          </p:cNvPr>
+          <p:cNvSpPr txBox="1"/>
+          <p:nvPr/>
+        </p:nvSpPr>
+        <p:spPr>
+          <a:xfrm>
+            <a:off x="6434137" y="1380372"/>
+            <a:ext cx="4395788" cy="307777"/>
+          </a:xfrm>
+          <a:prstGeom prst="rect">
+            <a:avLst/>
+          </a:prstGeom>
+          <a:solidFill>
+            <a:srgbClr val="FFFFFF">
+              <a:alpha val="60000"/>
+            </a:srgbClr>
+          </a:solidFill>
+        </p:spPr>
+        <p:txBody>
+          <a:bodyPr wrap="square" rtlCol="0">
+            <a:spAutoFit/>
+          </a:bodyPr>
+          <a:lstStyle/>
+          <a:p>
+            <a:pPr algn="ctr"/>
+            <a:r>
+              <a:rPr lang="fr-FR" sz="1400" b="1" dirty="0">
+                <a:solidFill>
+                  <a:srgbClr val="FF0000"/>
+                </a:solidFill>
+                <a:latin typeface="Lora" panose="02000503000000020004" pitchFamily="2" charset="0"/>
+              </a:rPr>
+              <a:t>Read </a:t>
+            </a:r>
+            <a:r>
+              <a:rPr lang="fr-FR" sz="1400" b="1" dirty="0" err="1">
+                <a:solidFill>
+                  <a:srgbClr val="FF0000"/>
+                </a:solidFill>
+                <a:latin typeface="Lora" panose="02000503000000020004" pitchFamily="2" charset="0"/>
+              </a:rPr>
+              <a:t>it</a:t>
+            </a:r>
+            <a:r>
+              <a:rPr lang="fr-FR" sz="1400" b="1" dirty="0">
+                <a:solidFill>
+                  <a:srgbClr val="FF0000"/>
+                </a:solidFill>
+                <a:latin typeface="Lora" panose="02000503000000020004" pitchFamily="2" charset="0"/>
+              </a:rPr>
+              <a:t> if </a:t>
+            </a:r>
+            <a:r>
+              <a:rPr lang="fr-FR" sz="1400" b="1" dirty="0" err="1">
+                <a:solidFill>
+                  <a:srgbClr val="FF0000"/>
+                </a:solidFill>
+                <a:latin typeface="Lora" panose="02000503000000020004" pitchFamily="2" charset="0"/>
+              </a:rPr>
+              <a:t>you</a:t>
+            </a:r>
+            <a:r>
+              <a:rPr lang="fr-FR" sz="1400" b="1" dirty="0">
+                <a:solidFill>
+                  <a:srgbClr val="FF0000"/>
+                </a:solidFill>
+                <a:latin typeface="Lora" panose="02000503000000020004" pitchFamily="2" charset="0"/>
+              </a:rPr>
+              <a:t> </a:t>
+            </a:r>
+            <a:r>
+              <a:rPr lang="fr-FR" sz="1400" b="1" dirty="0" err="1">
+                <a:solidFill>
+                  <a:srgbClr val="FF0000"/>
+                </a:solidFill>
+                <a:latin typeface="Lora" panose="02000503000000020004" pitchFamily="2" charset="0"/>
+              </a:rPr>
+              <a:t>don’t</a:t>
+            </a:r>
+            <a:r>
+              <a:rPr lang="fr-FR" sz="1400" b="1" dirty="0">
+                <a:solidFill>
+                  <a:srgbClr val="FF0000"/>
+                </a:solidFill>
+                <a:latin typeface="Lora" panose="02000503000000020004" pitchFamily="2" charset="0"/>
+              </a:rPr>
+              <a:t> </a:t>
+            </a:r>
+            <a:r>
+              <a:rPr lang="fr-FR" sz="1400" b="1" dirty="0" err="1">
+                <a:solidFill>
+                  <a:srgbClr val="FF0000"/>
+                </a:solidFill>
+                <a:latin typeface="Lora" panose="02000503000000020004" pitchFamily="2" charset="0"/>
+              </a:rPr>
+              <a:t>understand</a:t>
+            </a:r>
+            <a:r>
+              <a:rPr lang="fr-FR" sz="1400" b="1" dirty="0">
+                <a:solidFill>
+                  <a:srgbClr val="FF0000"/>
+                </a:solidFill>
+                <a:latin typeface="Lora" panose="02000503000000020004" pitchFamily="2" charset="0"/>
+              </a:rPr>
+              <a:t> the </a:t>
+            </a:r>
+            <a:r>
+              <a:rPr lang="fr-FR" sz="1400" b="1" dirty="0" err="1">
+                <a:solidFill>
+                  <a:srgbClr val="FF0000"/>
+                </a:solidFill>
+                <a:latin typeface="Lora" panose="02000503000000020004" pitchFamily="2" charset="0"/>
+              </a:rPr>
+              <a:t>weight</a:t>
+            </a:r>
+            <a:r>
+              <a:rPr lang="fr-FR" sz="1400" b="1" dirty="0">
+                <a:solidFill>
+                  <a:srgbClr val="FF0000"/>
+                </a:solidFill>
+                <a:latin typeface="Lora" panose="02000503000000020004" pitchFamily="2" charset="0"/>
+              </a:rPr>
+              <a:t> system !</a:t>
+            </a:r>
+          </a:p>
+        </p:txBody>
+      </p:sp>
+      <p:sp>
+        <p:nvSpPr>
+          <p:cNvPr id="25" name="Accolade ouvrante 24">
+            <a:extLst>
+              <a:ext uri="{FF2B5EF4-FFF2-40B4-BE49-F238E27FC236}">
+                <a16:creationId xmlns:a16="http://schemas.microsoft.com/office/drawing/2014/main" id="{EFBFAB7B-9FF9-A7AE-774F-B3D446488893}"/>
+              </a:ext>
+            </a:extLst>
+          </p:cNvPr>
+          <p:cNvSpPr/>
+          <p:nvPr/>
+        </p:nvSpPr>
+        <p:spPr>
+          <a:xfrm>
+            <a:off x="3550234" y="1688149"/>
+            <a:ext cx="459791" cy="1512251"/>
+          </a:xfrm>
+          <a:prstGeom prst="leftBrace">
+            <a:avLst/>
+          </a:prstGeom>
+          <a:ln w="38100">
+            <a:solidFill>
+              <a:srgbClr val="FF0000"/>
+            </a:solidFill>
+          </a:ln>
+        </p:spPr>
+        <p:style>
+          <a:lnRef idx="2">
+            <a:schemeClr val="accent1"/>
+          </a:lnRef>
+          <a:fillRef idx="0">
+            <a:schemeClr val="accent1"/>
+          </a:fillRef>
+          <a:effectRef idx="1">
+            <a:schemeClr val="accent1"/>
+          </a:effectRef>
+          <a:fontRef idx="minor">
+            <a:schemeClr val="tx1"/>
+          </a:fontRef>
+        </p:style>
+        <p:txBody>
+          <a:bodyPr rtlCol="0" anchor="ctr"/>
+          <a:lstStyle/>
+          <a:p>
+            <a:pPr algn="ctr"/>
+            <a:endParaRPr lang="fr-FR"/>
+          </a:p>
+        </p:txBody>
+      </p:sp>
+      <p:sp>
+        <p:nvSpPr>
+          <p:cNvPr id="26" name="ZoneTexte 25">
+            <a:extLst>
+              <a:ext uri="{FF2B5EF4-FFF2-40B4-BE49-F238E27FC236}">
+                <a16:creationId xmlns:a16="http://schemas.microsoft.com/office/drawing/2014/main" id="{460A3FCD-8E6F-5C04-36DA-37C6FE14CB97}"/>
+              </a:ext>
+            </a:extLst>
+          </p:cNvPr>
+          <p:cNvSpPr txBox="1"/>
+          <p:nvPr/>
+        </p:nvSpPr>
+        <p:spPr>
+          <a:xfrm>
+            <a:off x="1119772" y="2182664"/>
+            <a:ext cx="2430462" cy="523220"/>
+          </a:xfrm>
+          <a:prstGeom prst="rect">
+            <a:avLst/>
+          </a:prstGeom>
+          <a:solidFill>
+            <a:srgbClr val="FFFFFF">
+              <a:alpha val="60000"/>
+            </a:srgbClr>
+          </a:solidFill>
+        </p:spPr>
+        <p:txBody>
+          <a:bodyPr wrap="square" rtlCol="0">
+            <a:spAutoFit/>
+          </a:bodyPr>
+          <a:lstStyle/>
+          <a:p>
+            <a:pPr algn="ctr"/>
+            <a:r>
+              <a:rPr lang="fr-FR" sz="1400" b="1" dirty="0">
+                <a:solidFill>
+                  <a:srgbClr val="FF0000"/>
+                </a:solidFill>
+                <a:latin typeface="Lora" panose="02000503000000020004" pitchFamily="2" charset="0"/>
+              </a:rPr>
+              <a:t>Control </a:t>
+            </a:r>
+            <a:r>
+              <a:rPr lang="fr-FR" sz="1400" b="1" dirty="0" err="1">
+                <a:solidFill>
+                  <a:srgbClr val="FF0000"/>
+                </a:solidFill>
+                <a:latin typeface="Lora" panose="02000503000000020004" pitchFamily="2" charset="0"/>
+              </a:rPr>
+              <a:t>spawnrate</a:t>
+            </a:r>
+            <a:r>
+              <a:rPr lang="fr-FR" sz="1400" b="1" dirty="0">
+                <a:solidFill>
+                  <a:srgbClr val="FF0000"/>
+                </a:solidFill>
+                <a:latin typeface="Lora" panose="02000503000000020004" pitchFamily="2" charset="0"/>
+              </a:rPr>
+              <a:t> for </a:t>
+            </a:r>
+            <a:r>
+              <a:rPr lang="fr-FR" sz="1400" b="1" dirty="0" err="1">
+                <a:solidFill>
+                  <a:srgbClr val="FF0000"/>
+                </a:solidFill>
+                <a:latin typeface="Lora" panose="02000503000000020004" pitchFamily="2" charset="0"/>
+              </a:rPr>
+              <a:t>each</a:t>
+            </a:r>
+            <a:r>
+              <a:rPr lang="fr-FR" sz="1400" b="1" dirty="0">
+                <a:solidFill>
+                  <a:srgbClr val="FF0000"/>
+                </a:solidFill>
+                <a:latin typeface="Lora" panose="02000503000000020004" pitchFamily="2" charset="0"/>
+              </a:rPr>
+              <a:t> </a:t>
+            </a:r>
+            <a:r>
+              <a:rPr lang="fr-FR" sz="1400" b="1" dirty="0" err="1">
+                <a:solidFill>
+                  <a:srgbClr val="FF0000"/>
+                </a:solidFill>
+                <a:latin typeface="Lora" panose="02000503000000020004" pitchFamily="2" charset="0"/>
+              </a:rPr>
+              <a:t>infected</a:t>
+            </a:r>
+            <a:r>
+              <a:rPr lang="fr-FR" sz="1400" b="1" dirty="0">
+                <a:solidFill>
+                  <a:srgbClr val="FF0000"/>
+                </a:solidFill>
+                <a:latin typeface="Lora" panose="02000503000000020004" pitchFamily="2" charset="0"/>
+              </a:rPr>
+              <a:t> types</a:t>
+            </a:r>
+          </a:p>
+        </p:txBody>
+      </p:sp>
+      <p:sp>
+        <p:nvSpPr>
+          <p:cNvPr id="28" name="Accolade ouvrante 27">
+            <a:extLst>
+              <a:ext uri="{FF2B5EF4-FFF2-40B4-BE49-F238E27FC236}">
+                <a16:creationId xmlns:a16="http://schemas.microsoft.com/office/drawing/2014/main" id="{5EDCEF1F-6D6F-DE77-5A91-5757AC6C6C33}"/>
+              </a:ext>
+            </a:extLst>
+          </p:cNvPr>
+          <p:cNvSpPr/>
+          <p:nvPr/>
+        </p:nvSpPr>
+        <p:spPr>
+          <a:xfrm rot="10800000">
+            <a:off x="3320336" y="3528682"/>
+            <a:ext cx="459791" cy="494515"/>
+          </a:xfrm>
+          <a:prstGeom prst="leftBrace">
+            <a:avLst/>
+          </a:prstGeom>
+          <a:ln w="38100">
+            <a:solidFill>
+              <a:srgbClr val="FF0000"/>
+            </a:solidFill>
+          </a:ln>
+        </p:spPr>
+        <p:style>
+          <a:lnRef idx="2">
+            <a:schemeClr val="accent1"/>
+          </a:lnRef>
+          <a:fillRef idx="0">
+            <a:schemeClr val="accent1"/>
+          </a:fillRef>
+          <a:effectRef idx="1">
+            <a:schemeClr val="accent1"/>
+          </a:effectRef>
+          <a:fontRef idx="minor">
+            <a:schemeClr val="tx1"/>
+          </a:fontRef>
+        </p:style>
+        <p:txBody>
+          <a:bodyPr rtlCol="0" anchor="ctr"/>
+          <a:lstStyle/>
+          <a:p>
+            <a:pPr algn="ctr"/>
+            <a:endParaRPr lang="fr-FR"/>
+          </a:p>
+        </p:txBody>
+      </p:sp>
+      <p:sp>
+        <p:nvSpPr>
+          <p:cNvPr id="29" name="ZoneTexte 28">
+            <a:extLst>
+              <a:ext uri="{FF2B5EF4-FFF2-40B4-BE49-F238E27FC236}">
+                <a16:creationId xmlns:a16="http://schemas.microsoft.com/office/drawing/2014/main" id="{1080BE6C-A16D-F2EF-89CA-D5B6297F60F3}"/>
+              </a:ext>
+            </a:extLst>
+          </p:cNvPr>
+          <p:cNvSpPr txBox="1"/>
+          <p:nvPr/>
+        </p:nvSpPr>
+        <p:spPr>
+          <a:xfrm>
+            <a:off x="3780127" y="3614719"/>
+            <a:ext cx="2525423" cy="307777"/>
+          </a:xfrm>
+          <a:prstGeom prst="rect">
+            <a:avLst/>
+          </a:prstGeom>
+          <a:solidFill>
+            <a:srgbClr val="FFFFFF">
+              <a:alpha val="60000"/>
+            </a:srgbClr>
+          </a:solidFill>
+        </p:spPr>
+        <p:txBody>
+          <a:bodyPr wrap="square" rtlCol="0">
+            <a:spAutoFit/>
+          </a:bodyPr>
+          <a:lstStyle/>
+          <a:p>
+            <a:pPr algn="ctr"/>
+            <a:r>
+              <a:rPr lang="fr-FR" sz="1400" b="1" dirty="0">
+                <a:solidFill>
+                  <a:srgbClr val="FF0000"/>
+                </a:solidFill>
+                <a:latin typeface="Lora" panose="02000503000000020004" pitchFamily="2" charset="0"/>
+              </a:rPr>
+              <a:t>Change stats of the </a:t>
+            </a:r>
+            <a:r>
+              <a:rPr lang="fr-FR" sz="1400" b="1" dirty="0" err="1">
+                <a:solidFill>
+                  <a:srgbClr val="FF0000"/>
+                </a:solidFill>
+                <a:latin typeface="Lora" panose="02000503000000020004" pitchFamily="2" charset="0"/>
+              </a:rPr>
+              <a:t>infected</a:t>
+            </a:r>
+            <a:endParaRPr lang="fr-FR" sz="1400" b="1" dirty="0">
+              <a:solidFill>
+                <a:srgbClr val="FF0000"/>
+              </a:solidFill>
+              <a:latin typeface="Lora" panose="02000503000000020004" pitchFamily="2" charset="0"/>
+            </a:endParaRPr>
+          </a:p>
+        </p:txBody>
+      </p:sp>
+    </p:spTree>
+    <p:extLst>
+      <p:ext uri="{BB962C8B-B14F-4D97-AF65-F5344CB8AC3E}">
+        <p14:creationId xmlns:p14="http://schemas.microsoft.com/office/powerpoint/2010/main" val="3659624394"/>
+      </p:ext>
+    </p:extLst>
+  </p:cSld>
+  <p:clrMapOvr>
+    <a:masterClrMapping/>
+  </p:clrMapOvr>
+</p:sld>
+</file>
+
+<file path=ppt/slides/slide8.xml><?xml version="1.0" encoding="utf-8"?>
+<p:sld xmlns:a="http://schemas.openxmlformats.org/drawingml/2006/main" xmlns:r="http://schemas.openxmlformats.org/officeDocument/2006/relationships" xmlns:p="http://schemas.openxmlformats.org/presentationml/2006/main">
+  <p:cSld>
+    <p:spTree>
+      <p:nvGrpSpPr>
+        <p:cNvPr id="1" name=""/>
+        <p:cNvGrpSpPr/>
+        <p:nvPr/>
+      </p:nvGrpSpPr>
+      <p:grpSpPr>
+        <a:xfrm>
+          <a:off x="0" y="0"/>
+          <a:ext cx="0" cy="0"/>
+          <a:chOff x="0" y="0"/>
+          <a:chExt cx="0" cy="0"/>
+        </a:xfrm>
+      </p:grpSpPr>
+    </p:spTree>
+    <p:extLst>
+      <p:ext uri="{BB962C8B-B14F-4D97-AF65-F5344CB8AC3E}">
+        <p14:creationId xmlns:p14="http://schemas.microsoft.com/office/powerpoint/2010/main" val="2602138433"/>
+      </p:ext>
+    </p:extLst>
+  </p:cSld>
+  <p:clrMapOvr>
+    <a:masterClrMapping/>
+  </p:clrMapOvr>
+</p:sld>
+</file>
+
 <file path=ppt/theme/theme1.xml><?xml version="1.0" encoding="utf-8"?>
 <a:theme xmlns:a="http://schemas.openxmlformats.org/drawingml/2006/main" name="Thème Office">
   <a:themeElements>

</xml_diff>